<commit_message>
add privacy slide, remove lock
</commit_message>
<xml_diff>
--- a/presentation/prelim.pptx
+++ b/presentation/prelim.pptx
@@ -3,14 +3,15 @@
 <p:presentation xmlns:a="http://schemas.openxmlformats.org/drawingml/2006/main" xmlns:p="http://schemas.openxmlformats.org/presentationml/2006/main" xmlns:r="http://schemas.openxmlformats.org/officeDocument/2006/relationships" xmlns:p14="http://schemas.microsoft.com/office/powerpoint/2010/main" xmlns:p15="http://schemas.microsoft.com/office/powerpoint/2012/main" xmlns:mc="http://schemas.openxmlformats.org/markup-compatibility/2006">
   <p:sldMasterIdLst>
     <p:sldMasterId id="2147483648" r:id="rId2"/>
+    <p:sldMasterId id="2147483661" r:id="rId3"/>
   </p:sldMasterIdLst>
   <p:notesMasterIdLst>
-    <p:notesMasterId r:id="rId3"/>
+    <p:notesMasterId r:id="rId4"/>
   </p:notesMasterIdLst>
   <p:sldIdLst>
-    <p:sldId id="256" r:id="rId4"/>
-    <p:sldId id="257" r:id="rId5"/>
-    <p:sldId id="258" r:id="rId6"/>
+    <p:sldId id="256" r:id="rId5"/>
+    <p:sldId id="257" r:id="rId6"/>
+    <p:sldId id="258" r:id="rId7"/>
   </p:sldIdLst>
   <p:sldSz cx="10080625" cy="7559675"/>
   <p:notesSz cx="7772400" cy="10058400"/>
@@ -36,7 +37,7 @@
       </p:grpSpPr>
       <p:sp>
         <p:nvSpPr>
-          <p:cNvPr id="39" name="PlaceHolder 1"/>
+          <p:cNvPr id="72" name="PlaceHolder 1"/>
           <p:cNvSpPr>
             <a:spLocks noGrp="1"/>
           </p:cNvSpPr>
@@ -86,7 +87,7 @@
       </p:sp>
       <p:sp>
         <p:nvSpPr>
-          <p:cNvPr id="40" name="PlaceHolder 2"/>
+          <p:cNvPr id="73" name="PlaceHolder 2"/>
           <p:cNvSpPr>
             <a:spLocks noGrp="1"/>
           </p:cNvSpPr>
@@ -118,7 +119,7 @@
                 </a:uFill>
                 <a:latin typeface="Times New Roman"/>
               </a:rPr>
-              <a:t> </a:t>
+              <a:t>&lt;header&gt;</a:t>
             </a:r>
             <a:endParaRPr b="0" lang="en-US" sz="1400" spc="-1" strike="noStrike">
               <a:solidFill>
@@ -136,7 +137,7 @@
       </p:sp>
       <p:sp>
         <p:nvSpPr>
-          <p:cNvPr id="41" name="PlaceHolder 3"/>
+          <p:cNvPr id="74" name="PlaceHolder 3"/>
           <p:cNvSpPr>
             <a:spLocks noGrp="1"/>
           </p:cNvSpPr>
@@ -169,7 +170,7 @@
                 </a:uFill>
                 <a:latin typeface="Times New Roman"/>
               </a:rPr>
-              <a:t> </a:t>
+              <a:t>&lt;date/time&gt;</a:t>
             </a:r>
             <a:endParaRPr b="0" lang="en-US" sz="1400" spc="-1" strike="noStrike">
               <a:solidFill>
@@ -187,7 +188,7 @@
       </p:sp>
       <p:sp>
         <p:nvSpPr>
-          <p:cNvPr id="42" name="PlaceHolder 4"/>
+          <p:cNvPr id="75" name="PlaceHolder 4"/>
           <p:cNvSpPr>
             <a:spLocks noGrp="1"/>
           </p:cNvSpPr>
@@ -219,7 +220,7 @@
                 </a:uFill>
                 <a:latin typeface="Times New Roman"/>
               </a:rPr>
-              <a:t> </a:t>
+              <a:t>&lt;footer&gt;</a:t>
             </a:r>
             <a:endParaRPr b="0" lang="en-US" sz="1400" spc="-1" strike="noStrike">
               <a:solidFill>
@@ -237,7 +238,7 @@
       </p:sp>
       <p:sp>
         <p:nvSpPr>
-          <p:cNvPr id="43" name="PlaceHolder 5"/>
+          <p:cNvPr id="76" name="PlaceHolder 5"/>
           <p:cNvSpPr>
             <a:spLocks noGrp="1"/>
           </p:cNvSpPr>
@@ -258,7 +259,7 @@
           <a:bodyPr lIns="0" rIns="0" tIns="0" bIns="0" anchor="b"/>
           <a:p>
             <a:pPr algn="r"/>
-            <a:fld id="{64006D0B-7725-4E58-A0E8-28965FE6971C}" type="slidenum">
+            <a:fld id="{F96A05BF-A139-4D6F-A992-B1DE9E7F6D3C}" type="slidenum">
               <a:rPr b="0" lang="en-US" sz="1400" spc="-1" strike="noStrike">
                 <a:solidFill>
                   <a:srgbClr val="000000"/>
@@ -270,7 +271,7 @@
                 </a:uFill>
                 <a:latin typeface="Times New Roman"/>
               </a:rPr>
-              <a:t>1</a:t>
+              <a:t>&lt;number&gt;</a:t>
             </a:fld>
             <a:endParaRPr b="0" lang="en-US" sz="1400" spc="-1" strike="noStrike">
               <a:solidFill>
@@ -311,7 +312,7 @@
       </p:grpSpPr>
       <p:sp>
         <p:nvSpPr>
-          <p:cNvPr id="52" name="PlaceHolder 1"/>
+          <p:cNvPr id="84" name="PlaceHolder 1"/>
           <p:cNvSpPr>
             <a:spLocks noGrp="1"/>
           </p:cNvSpPr>
@@ -322,7 +323,7 @@
         <p:spPr>
           <a:xfrm>
             <a:off x="777240" y="4777560"/>
-            <a:ext cx="6217560" cy="4525920"/>
+            <a:ext cx="6217200" cy="4525560"/>
           </a:xfrm>
           <a:prstGeom prst="rect">
             <a:avLst/>
@@ -343,21 +344,7 @@
                 </a:uFill>
                 <a:latin typeface="Arial"/>
               </a:rPr>
-              <a:t>Equifax and cambridge </a:t>
-            </a:r>
-            <a:r>
-              <a:rPr b="0" lang="en-US" sz="2000" spc="-1" strike="noStrike">
-                <a:solidFill>
-                  <a:srgbClr val="000000"/>
-                </a:solidFill>
-                <a:uFill>
-                  <a:solidFill>
-                    <a:srgbClr val="ffffff"/>
-                  </a:solidFill>
-                </a:uFill>
-                <a:latin typeface="Arial"/>
-              </a:rPr>
-              <a:t>analytica </a:t>
+              <a:t>Equifax and cambridge analytica </a:t>
             </a:r>
             <a:endParaRPr b="0" lang="en-US" sz="2000" spc="-1" strike="noStrike">
               <a:solidFill>
@@ -437,8 +424,34 @@
                 </a:uFill>
                 <a:latin typeface="Arial"/>
               </a:rPr>
-              <a:t>Gap between current </a:t>
+              <a:t>Gap between current research and usability</a:t>
             </a:r>
+            <a:endParaRPr b="0" lang="en-US" sz="2000" spc="-1" strike="noStrike">
+              <a:solidFill>
+                <a:srgbClr val="000000"/>
+              </a:solidFill>
+              <a:uFill>
+                <a:solidFill>
+                  <a:srgbClr val="ffffff"/>
+                </a:solidFill>
+              </a:uFill>
+              <a:latin typeface="Arial"/>
+            </a:endParaRPr>
+          </a:p>
+          <a:p>
+            <a:endParaRPr b="0" lang="en-US" sz="2000" spc="-1" strike="noStrike">
+              <a:solidFill>
+                <a:srgbClr val="000000"/>
+              </a:solidFill>
+              <a:uFill>
+                <a:solidFill>
+                  <a:srgbClr val="ffffff"/>
+                </a:solidFill>
+              </a:uFill>
+              <a:latin typeface="Arial"/>
+            </a:endParaRPr>
+          </a:p>
+          <a:p>
             <a:r>
               <a:rPr b="0" lang="en-US" sz="2000" spc="-1" strike="noStrike">
                 <a:solidFill>
@@ -451,61 +464,7 @@
                 </a:uFill>
                 <a:latin typeface="Arial"/>
               </a:rPr>
-              <a:t>research and usability</a:t>
-            </a:r>
-            <a:endParaRPr b="0" lang="en-US" sz="2000" spc="-1" strike="noStrike">
-              <a:solidFill>
-                <a:srgbClr val="000000"/>
-              </a:solidFill>
-              <a:uFill>
-                <a:solidFill>
-                  <a:srgbClr val="ffffff"/>
-                </a:solidFill>
-              </a:uFill>
-              <a:latin typeface="Arial"/>
-            </a:endParaRPr>
-          </a:p>
-          <a:p>
-            <a:endParaRPr b="0" lang="en-US" sz="2000" spc="-1" strike="noStrike">
-              <a:solidFill>
-                <a:srgbClr val="000000"/>
-              </a:solidFill>
-              <a:uFill>
-                <a:solidFill>
-                  <a:srgbClr val="ffffff"/>
-                </a:solidFill>
-              </a:uFill>
-              <a:latin typeface="Arial"/>
-            </a:endParaRPr>
-          </a:p>
-          <a:p>
-            <a:r>
-              <a:rPr b="0" lang="en-US" sz="2000" spc="-1" strike="noStrike">
-                <a:solidFill>
-                  <a:srgbClr val="000000"/>
-                </a:solidFill>
-                <a:uFill>
-                  <a:solidFill>
-                    <a:srgbClr val="ffffff"/>
-                  </a:solidFill>
-                </a:uFill>
-                <a:latin typeface="Arial"/>
-              </a:rPr>
-              <a:t>Current research → </a:t>
-            </a:r>
-            <a:r>
-              <a:rPr b="0" lang="en-US" sz="2000" spc="-1" strike="noStrike">
-                <a:solidFill>
-                  <a:srgbClr val="000000"/>
-                </a:solidFill>
-                <a:uFill>
-                  <a:solidFill>
-                    <a:srgbClr val="ffffff"/>
-                  </a:solidFill>
-                </a:uFill>
-                <a:latin typeface="Arial"/>
-              </a:rPr>
-              <a:t>what is missing</a:t>
+              <a:t>Current research → what is missing</a:t>
             </a:r>
             <a:endParaRPr b="0" lang="en-US" sz="2000" spc="-1" strike="noStrike">
               <a:solidFill>
@@ -567,7 +526,7 @@
       </p:grpSpPr>
       <p:sp>
         <p:nvSpPr>
-          <p:cNvPr id="26" name="PlaceHolder 1"/>
+          <p:cNvPr id="23" name="PlaceHolder 1"/>
           <p:cNvSpPr>
             <a:spLocks noGrp="1"/>
           </p:cNvSpPr>
@@ -578,7 +537,7 @@
         <p:spPr>
           <a:xfrm>
             <a:off x="504000" y="301320"/>
-            <a:ext cx="9071640" cy="1262160"/>
+            <a:ext cx="9071280" cy="1261800"/>
           </a:xfrm>
           <a:prstGeom prst="rect">
             <a:avLst/>
@@ -604,7 +563,7 @@
       </p:sp>
       <p:sp>
         <p:nvSpPr>
-          <p:cNvPr id="27" name="PlaceHolder 2"/>
+          <p:cNvPr id="24" name="PlaceHolder 2"/>
           <p:cNvSpPr>
             <a:spLocks noGrp="1"/>
           </p:cNvSpPr>
@@ -615,7 +574,7 @@
         <p:spPr>
           <a:xfrm>
             <a:off x="504000" y="1769040"/>
-            <a:ext cx="9071640" cy="2091240"/>
+            <a:ext cx="9071280" cy="2090880"/>
           </a:xfrm>
           <a:prstGeom prst="rect">
             <a:avLst/>
@@ -640,7 +599,7 @@
       </p:sp>
       <p:sp>
         <p:nvSpPr>
-          <p:cNvPr id="28" name="PlaceHolder 3"/>
+          <p:cNvPr id="25" name="PlaceHolder 3"/>
           <p:cNvSpPr>
             <a:spLocks noGrp="1"/>
           </p:cNvSpPr>
@@ -650,8 +609,8 @@
         </p:nvSpPr>
         <p:spPr>
           <a:xfrm>
-            <a:off x="504000" y="4059360"/>
-            <a:ext cx="9071640" cy="2091240"/>
+            <a:off x="504000" y="4059000"/>
+            <a:ext cx="9071280" cy="2090880"/>
           </a:xfrm>
           <a:prstGeom prst="rect">
             <a:avLst/>
@@ -698,7 +657,7 @@
       </p:grpSpPr>
       <p:sp>
         <p:nvSpPr>
-          <p:cNvPr id="29" name="PlaceHolder 1"/>
+          <p:cNvPr id="26" name="PlaceHolder 1"/>
           <p:cNvSpPr>
             <a:spLocks noGrp="1"/>
           </p:cNvSpPr>
@@ -709,7 +668,7 @@
         <p:spPr>
           <a:xfrm>
             <a:off x="504000" y="301320"/>
-            <a:ext cx="9071640" cy="1262160"/>
+            <a:ext cx="9071280" cy="1261800"/>
           </a:xfrm>
           <a:prstGeom prst="rect">
             <a:avLst/>
@@ -735,7 +694,7 @@
       </p:sp>
       <p:sp>
         <p:nvSpPr>
-          <p:cNvPr id="30" name="PlaceHolder 2"/>
+          <p:cNvPr id="27" name="PlaceHolder 2"/>
           <p:cNvSpPr>
             <a:spLocks noGrp="1"/>
           </p:cNvSpPr>
@@ -746,7 +705,7 @@
         <p:spPr>
           <a:xfrm>
             <a:off x="504000" y="1769040"/>
-            <a:ext cx="4426920" cy="2091240"/>
+            <a:ext cx="4426560" cy="2090880"/>
           </a:xfrm>
           <a:prstGeom prst="rect">
             <a:avLst/>
@@ -771,7 +730,7 @@
       </p:sp>
       <p:sp>
         <p:nvSpPr>
-          <p:cNvPr id="31" name="PlaceHolder 3"/>
+          <p:cNvPr id="28" name="PlaceHolder 3"/>
           <p:cNvSpPr>
             <a:spLocks noGrp="1"/>
           </p:cNvSpPr>
@@ -781,8 +740,8 @@
         </p:nvSpPr>
         <p:spPr>
           <a:xfrm>
-            <a:off x="5152680" y="1769040"/>
-            <a:ext cx="4426920" cy="2091240"/>
+            <a:off x="5152320" y="1769040"/>
+            <a:ext cx="4426560" cy="2090880"/>
           </a:xfrm>
           <a:prstGeom prst="rect">
             <a:avLst/>
@@ -807,7 +766,7 @@
       </p:sp>
       <p:sp>
         <p:nvSpPr>
-          <p:cNvPr id="32" name="PlaceHolder 4"/>
+          <p:cNvPr id="29" name="PlaceHolder 4"/>
           <p:cNvSpPr>
             <a:spLocks noGrp="1"/>
           </p:cNvSpPr>
@@ -817,8 +776,8 @@
         </p:nvSpPr>
         <p:spPr>
           <a:xfrm>
-            <a:off x="5152680" y="4059360"/>
-            <a:ext cx="4426920" cy="2091240"/>
+            <a:off x="5152320" y="4059000"/>
+            <a:ext cx="4426560" cy="2090880"/>
           </a:xfrm>
           <a:prstGeom prst="rect">
             <a:avLst/>
@@ -843,7 +802,7 @@
       </p:sp>
       <p:sp>
         <p:nvSpPr>
-          <p:cNvPr id="33" name="PlaceHolder 5"/>
+          <p:cNvPr id="30" name="PlaceHolder 5"/>
           <p:cNvSpPr>
             <a:spLocks noGrp="1"/>
           </p:cNvSpPr>
@@ -853,8 +812,8 @@
         </p:nvSpPr>
         <p:spPr>
           <a:xfrm>
-            <a:off x="504000" y="4059360"/>
-            <a:ext cx="4426920" cy="2091240"/>
+            <a:off x="504000" y="4059000"/>
+            <a:ext cx="4426560" cy="2090880"/>
           </a:xfrm>
           <a:prstGeom prst="rect">
             <a:avLst/>
@@ -901,7 +860,7 @@
       </p:grpSpPr>
       <p:sp>
         <p:nvSpPr>
-          <p:cNvPr id="34" name="PlaceHolder 1"/>
+          <p:cNvPr id="31" name="PlaceHolder 1"/>
           <p:cNvSpPr>
             <a:spLocks noGrp="1"/>
           </p:cNvSpPr>
@@ -912,7 +871,7 @@
         <p:spPr>
           <a:xfrm>
             <a:off x="504000" y="301320"/>
-            <a:ext cx="9071640" cy="1262160"/>
+            <a:ext cx="9071280" cy="1261800"/>
           </a:xfrm>
           <a:prstGeom prst="rect">
             <a:avLst/>
@@ -938,7 +897,7 @@
       </p:sp>
       <p:sp>
         <p:nvSpPr>
-          <p:cNvPr id="35" name="PlaceHolder 2"/>
+          <p:cNvPr id="32" name="PlaceHolder 2"/>
           <p:cNvSpPr>
             <a:spLocks noGrp="1"/>
           </p:cNvSpPr>
@@ -949,7 +908,7 @@
         <p:spPr>
           <a:xfrm>
             <a:off x="504000" y="1769040"/>
-            <a:ext cx="9071640" cy="4384440"/>
+            <a:ext cx="9071280" cy="4384080"/>
           </a:xfrm>
           <a:prstGeom prst="rect">
             <a:avLst/>
@@ -974,7 +933,7 @@
       </p:sp>
       <p:sp>
         <p:nvSpPr>
-          <p:cNvPr id="36" name="PlaceHolder 3"/>
+          <p:cNvPr id="33" name="PlaceHolder 3"/>
           <p:cNvSpPr>
             <a:spLocks noGrp="1"/>
           </p:cNvSpPr>
@@ -985,7 +944,7 @@
         <p:spPr>
           <a:xfrm>
             <a:off x="504000" y="1769040"/>
-            <a:ext cx="9071640" cy="4384440"/>
+            <a:ext cx="9071280" cy="4384080"/>
           </a:xfrm>
           <a:prstGeom prst="rect">
             <a:avLst/>
@@ -1010,7 +969,7 @@
       </p:sp>
       <p:pic>
         <p:nvPicPr>
-          <p:cNvPr id="37" name="" descr=""/>
+          <p:cNvPr id="34" name="" descr=""/>
           <p:cNvPicPr/>
           <p:nvPr/>
         </p:nvPicPr>
@@ -1020,8 +979,8 @@
         </p:blipFill>
         <p:spPr>
           <a:xfrm>
-            <a:off x="2292120" y="1768680"/>
-            <a:ext cx="5495040" cy="4384440"/>
+            <a:off x="2292120" y="1769040"/>
+            <a:ext cx="5494680" cy="4384080"/>
           </a:xfrm>
           <a:prstGeom prst="rect">
             <a:avLst/>
@@ -1033,7 +992,7 @@
       </p:pic>
       <p:pic>
         <p:nvPicPr>
-          <p:cNvPr id="38" name="" descr=""/>
+          <p:cNvPr id="35" name="" descr=""/>
           <p:cNvPicPr/>
           <p:nvPr/>
         </p:nvPicPr>
@@ -1043,8 +1002,8 @@
         </p:blipFill>
         <p:spPr>
           <a:xfrm>
-            <a:off x="2292120" y="1768680"/>
-            <a:ext cx="5495040" cy="4384440"/>
+            <a:off x="2292120" y="1769040"/>
+            <a:ext cx="5494680" cy="4384080"/>
           </a:xfrm>
           <a:prstGeom prst="rect">
             <a:avLst/>
@@ -1054,6 +1013,635 @@
           </a:ln>
         </p:spPr>
       </p:pic>
+    </p:spTree>
+  </p:cSld>
+</p:sldLayout>
+</file>
+
+<file path=ppt/slideLayouts/slideLayout13.xml><?xml version="1.0" encoding="utf-8"?>
+<p:sldLayout xmlns:a="http://schemas.openxmlformats.org/drawingml/2006/main" xmlns:p="http://schemas.openxmlformats.org/presentationml/2006/main" xmlns:r="http://schemas.openxmlformats.org/officeDocument/2006/relationships" xmlns:p14="http://schemas.microsoft.com/office/powerpoint/2010/main" xmlns:p15="http://schemas.microsoft.com/office/powerpoint/2012/main" xmlns:mc="http://schemas.openxmlformats.org/markup-compatibility/2006" type="blank" preserve="1">
+  <p:cSld name="Blank Slide">
+    <p:spTree>
+      <p:nvGrpSpPr>
+        <p:cNvPr id="1" name=""/>
+        <p:cNvGrpSpPr/>
+        <p:nvPr/>
+      </p:nvGrpSpPr>
+      <p:grpSpPr>
+        <a:xfrm>
+          <a:off x="0" y="0"/>
+          <a:ext cx="0" cy="0"/>
+          <a:chOff x="0" y="0"/>
+          <a:chExt cx="0" cy="0"/>
+        </a:xfrm>
+      </p:grpSpPr>
+    </p:spTree>
+  </p:cSld>
+</p:sldLayout>
+</file>
+
+<file path=ppt/slideLayouts/slideLayout14.xml><?xml version="1.0" encoding="utf-8"?>
+<p:sldLayout xmlns:a="http://schemas.openxmlformats.org/drawingml/2006/main" xmlns:p="http://schemas.openxmlformats.org/presentationml/2006/main" xmlns:r="http://schemas.openxmlformats.org/officeDocument/2006/relationships" xmlns:p14="http://schemas.microsoft.com/office/powerpoint/2010/main" xmlns:p15="http://schemas.microsoft.com/office/powerpoint/2012/main" xmlns:mc="http://schemas.openxmlformats.org/markup-compatibility/2006" type="tx" preserve="1">
+  <p:cSld name="Title Slide">
+    <p:spTree>
+      <p:nvGrpSpPr>
+        <p:cNvPr id="1" name=""/>
+        <p:cNvGrpSpPr/>
+        <p:nvPr/>
+      </p:nvGrpSpPr>
+      <p:grpSpPr>
+        <a:xfrm>
+          <a:off x="0" y="0"/>
+          <a:ext cx="0" cy="0"/>
+          <a:chOff x="0" y="0"/>
+          <a:chExt cx="0" cy="0"/>
+        </a:xfrm>
+      </p:grpSpPr>
+      <p:sp>
+        <p:nvSpPr>
+          <p:cNvPr id="38" name="PlaceHolder 1"/>
+          <p:cNvSpPr>
+            <a:spLocks noGrp="1"/>
+          </p:cNvSpPr>
+          <p:nvPr>
+            <p:ph type="title"/>
+          </p:nvPr>
+        </p:nvSpPr>
+        <p:spPr>
+          <a:xfrm>
+            <a:off x="504000" y="301320"/>
+            <a:ext cx="9071280" cy="1261800"/>
+          </a:xfrm>
+          <a:prstGeom prst="rect">
+            <a:avLst/>
+          </a:prstGeom>
+        </p:spPr>
+        <p:txBody>
+          <a:bodyPr lIns="0" rIns="0" tIns="0" bIns="0" anchor="ctr"/>
+          <a:p>
+            <a:pPr algn="ctr"/>
+            <a:endParaRPr b="0" lang="en-US" sz="4400" spc="-1" strike="noStrike">
+              <a:solidFill>
+                <a:srgbClr val="000000"/>
+              </a:solidFill>
+              <a:uFill>
+                <a:solidFill>
+                  <a:srgbClr val="ffffff"/>
+                </a:solidFill>
+              </a:uFill>
+              <a:latin typeface="Arial"/>
+            </a:endParaRPr>
+          </a:p>
+        </p:txBody>
+      </p:sp>
+      <p:sp>
+        <p:nvSpPr>
+          <p:cNvPr id="39" name="PlaceHolder 2"/>
+          <p:cNvSpPr>
+            <a:spLocks noGrp="1"/>
+          </p:cNvSpPr>
+          <p:nvPr>
+            <p:ph type="subTitle"/>
+          </p:nvPr>
+        </p:nvSpPr>
+        <p:spPr>
+          <a:xfrm>
+            <a:off x="504000" y="1769040"/>
+            <a:ext cx="9071280" cy="4384080"/>
+          </a:xfrm>
+          <a:prstGeom prst="rect">
+            <a:avLst/>
+          </a:prstGeom>
+        </p:spPr>
+        <p:txBody>
+          <a:bodyPr lIns="0" rIns="0" tIns="0" bIns="0" anchor="ctr"/>
+          <a:p>
+            <a:pPr algn="ctr"/>
+            <a:endParaRPr b="0" lang="en-US" sz="3200" spc="-1" strike="noStrike">
+              <a:solidFill>
+                <a:srgbClr val="000000"/>
+              </a:solidFill>
+              <a:uFill>
+                <a:solidFill>
+                  <a:srgbClr val="ffffff"/>
+                </a:solidFill>
+              </a:uFill>
+              <a:latin typeface="Arial"/>
+            </a:endParaRPr>
+          </a:p>
+        </p:txBody>
+      </p:sp>
+    </p:spTree>
+  </p:cSld>
+</p:sldLayout>
+</file>
+
+<file path=ppt/slideLayouts/slideLayout15.xml><?xml version="1.0" encoding="utf-8"?>
+<p:sldLayout xmlns:a="http://schemas.openxmlformats.org/drawingml/2006/main" xmlns:p="http://schemas.openxmlformats.org/presentationml/2006/main" xmlns:r="http://schemas.openxmlformats.org/officeDocument/2006/relationships" xmlns:p14="http://schemas.microsoft.com/office/powerpoint/2010/main" xmlns:p15="http://schemas.microsoft.com/office/powerpoint/2012/main" xmlns:mc="http://schemas.openxmlformats.org/markup-compatibility/2006" type="obj" preserve="1">
+  <p:cSld name="Title, Content">
+    <p:spTree>
+      <p:nvGrpSpPr>
+        <p:cNvPr id="1" name=""/>
+        <p:cNvGrpSpPr/>
+        <p:nvPr/>
+      </p:nvGrpSpPr>
+      <p:grpSpPr>
+        <a:xfrm>
+          <a:off x="0" y="0"/>
+          <a:ext cx="0" cy="0"/>
+          <a:chOff x="0" y="0"/>
+          <a:chExt cx="0" cy="0"/>
+        </a:xfrm>
+      </p:grpSpPr>
+      <p:sp>
+        <p:nvSpPr>
+          <p:cNvPr id="40" name="PlaceHolder 1"/>
+          <p:cNvSpPr>
+            <a:spLocks noGrp="1"/>
+          </p:cNvSpPr>
+          <p:nvPr>
+            <p:ph type="title"/>
+          </p:nvPr>
+        </p:nvSpPr>
+        <p:spPr>
+          <a:xfrm>
+            <a:off x="504000" y="301320"/>
+            <a:ext cx="9071280" cy="1261800"/>
+          </a:xfrm>
+          <a:prstGeom prst="rect">
+            <a:avLst/>
+          </a:prstGeom>
+        </p:spPr>
+        <p:txBody>
+          <a:bodyPr lIns="0" rIns="0" tIns="0" bIns="0" anchor="ctr"/>
+          <a:p>
+            <a:pPr algn="ctr"/>
+            <a:endParaRPr b="0" lang="en-US" sz="4400" spc="-1" strike="noStrike">
+              <a:solidFill>
+                <a:srgbClr val="000000"/>
+              </a:solidFill>
+              <a:uFill>
+                <a:solidFill>
+                  <a:srgbClr val="ffffff"/>
+                </a:solidFill>
+              </a:uFill>
+              <a:latin typeface="Arial"/>
+            </a:endParaRPr>
+          </a:p>
+        </p:txBody>
+      </p:sp>
+      <p:sp>
+        <p:nvSpPr>
+          <p:cNvPr id="41" name="PlaceHolder 2"/>
+          <p:cNvSpPr>
+            <a:spLocks noGrp="1"/>
+          </p:cNvSpPr>
+          <p:nvPr>
+            <p:ph type="body"/>
+          </p:nvPr>
+        </p:nvSpPr>
+        <p:spPr>
+          <a:xfrm>
+            <a:off x="504000" y="1769040"/>
+            <a:ext cx="9071280" cy="4384080"/>
+          </a:xfrm>
+          <a:prstGeom prst="rect">
+            <a:avLst/>
+          </a:prstGeom>
+        </p:spPr>
+        <p:txBody>
+          <a:bodyPr lIns="0" rIns="0" tIns="0" bIns="0"/>
+          <a:p>
+            <a:endParaRPr b="0" lang="en-US" sz="3200" spc="-1" strike="noStrike">
+              <a:solidFill>
+                <a:srgbClr val="000000"/>
+              </a:solidFill>
+              <a:uFill>
+                <a:solidFill>
+                  <a:srgbClr val="ffffff"/>
+                </a:solidFill>
+              </a:uFill>
+              <a:latin typeface="Arial"/>
+            </a:endParaRPr>
+          </a:p>
+        </p:txBody>
+      </p:sp>
+    </p:spTree>
+  </p:cSld>
+</p:sldLayout>
+</file>
+
+<file path=ppt/slideLayouts/slideLayout16.xml><?xml version="1.0" encoding="utf-8"?>
+<p:sldLayout xmlns:a="http://schemas.openxmlformats.org/drawingml/2006/main" xmlns:p="http://schemas.openxmlformats.org/presentationml/2006/main" xmlns:r="http://schemas.openxmlformats.org/officeDocument/2006/relationships" xmlns:p14="http://schemas.microsoft.com/office/powerpoint/2010/main" xmlns:p15="http://schemas.microsoft.com/office/powerpoint/2012/main" xmlns:mc="http://schemas.openxmlformats.org/markup-compatibility/2006" type="twoObj" preserve="1">
+  <p:cSld name="Title, 2 Content">
+    <p:spTree>
+      <p:nvGrpSpPr>
+        <p:cNvPr id="1" name=""/>
+        <p:cNvGrpSpPr/>
+        <p:nvPr/>
+      </p:nvGrpSpPr>
+      <p:grpSpPr>
+        <a:xfrm>
+          <a:off x="0" y="0"/>
+          <a:ext cx="0" cy="0"/>
+          <a:chOff x="0" y="0"/>
+          <a:chExt cx="0" cy="0"/>
+        </a:xfrm>
+      </p:grpSpPr>
+      <p:sp>
+        <p:nvSpPr>
+          <p:cNvPr id="42" name="PlaceHolder 1"/>
+          <p:cNvSpPr>
+            <a:spLocks noGrp="1"/>
+          </p:cNvSpPr>
+          <p:nvPr>
+            <p:ph type="title"/>
+          </p:nvPr>
+        </p:nvSpPr>
+        <p:spPr>
+          <a:xfrm>
+            <a:off x="504000" y="301320"/>
+            <a:ext cx="9071280" cy="1261800"/>
+          </a:xfrm>
+          <a:prstGeom prst="rect">
+            <a:avLst/>
+          </a:prstGeom>
+        </p:spPr>
+        <p:txBody>
+          <a:bodyPr lIns="0" rIns="0" tIns="0" bIns="0" anchor="ctr"/>
+          <a:p>
+            <a:pPr algn="ctr"/>
+            <a:endParaRPr b="0" lang="en-US" sz="4400" spc="-1" strike="noStrike">
+              <a:solidFill>
+                <a:srgbClr val="000000"/>
+              </a:solidFill>
+              <a:uFill>
+                <a:solidFill>
+                  <a:srgbClr val="ffffff"/>
+                </a:solidFill>
+              </a:uFill>
+              <a:latin typeface="Arial"/>
+            </a:endParaRPr>
+          </a:p>
+        </p:txBody>
+      </p:sp>
+      <p:sp>
+        <p:nvSpPr>
+          <p:cNvPr id="43" name="PlaceHolder 2"/>
+          <p:cNvSpPr>
+            <a:spLocks noGrp="1"/>
+          </p:cNvSpPr>
+          <p:nvPr>
+            <p:ph type="body"/>
+          </p:nvPr>
+        </p:nvSpPr>
+        <p:spPr>
+          <a:xfrm>
+            <a:off x="504000" y="1769040"/>
+            <a:ext cx="4426560" cy="4384080"/>
+          </a:xfrm>
+          <a:prstGeom prst="rect">
+            <a:avLst/>
+          </a:prstGeom>
+        </p:spPr>
+        <p:txBody>
+          <a:bodyPr lIns="0" rIns="0" tIns="0" bIns="0"/>
+          <a:p>
+            <a:endParaRPr b="0" lang="en-US" sz="3200" spc="-1" strike="noStrike">
+              <a:solidFill>
+                <a:srgbClr val="000000"/>
+              </a:solidFill>
+              <a:uFill>
+                <a:solidFill>
+                  <a:srgbClr val="ffffff"/>
+                </a:solidFill>
+              </a:uFill>
+              <a:latin typeface="Arial"/>
+            </a:endParaRPr>
+          </a:p>
+        </p:txBody>
+      </p:sp>
+      <p:sp>
+        <p:nvSpPr>
+          <p:cNvPr id="44" name="PlaceHolder 3"/>
+          <p:cNvSpPr>
+            <a:spLocks noGrp="1"/>
+          </p:cNvSpPr>
+          <p:nvPr>
+            <p:ph type="body"/>
+          </p:nvPr>
+        </p:nvSpPr>
+        <p:spPr>
+          <a:xfrm>
+            <a:off x="5152320" y="1769040"/>
+            <a:ext cx="4426560" cy="4384080"/>
+          </a:xfrm>
+          <a:prstGeom prst="rect">
+            <a:avLst/>
+          </a:prstGeom>
+        </p:spPr>
+        <p:txBody>
+          <a:bodyPr lIns="0" rIns="0" tIns="0" bIns="0"/>
+          <a:p>
+            <a:endParaRPr b="0" lang="en-US" sz="3200" spc="-1" strike="noStrike">
+              <a:solidFill>
+                <a:srgbClr val="000000"/>
+              </a:solidFill>
+              <a:uFill>
+                <a:solidFill>
+                  <a:srgbClr val="ffffff"/>
+                </a:solidFill>
+              </a:uFill>
+              <a:latin typeface="Arial"/>
+            </a:endParaRPr>
+          </a:p>
+        </p:txBody>
+      </p:sp>
+    </p:spTree>
+  </p:cSld>
+</p:sldLayout>
+</file>
+
+<file path=ppt/slideLayouts/slideLayout17.xml><?xml version="1.0" encoding="utf-8"?>
+<p:sldLayout xmlns:a="http://schemas.openxmlformats.org/drawingml/2006/main" xmlns:p="http://schemas.openxmlformats.org/presentationml/2006/main" xmlns:r="http://schemas.openxmlformats.org/officeDocument/2006/relationships" xmlns:p14="http://schemas.microsoft.com/office/powerpoint/2010/main" xmlns:p15="http://schemas.microsoft.com/office/powerpoint/2012/main" xmlns:mc="http://schemas.openxmlformats.org/markup-compatibility/2006" type="titleOnly" preserve="1">
+  <p:cSld name="Title Only">
+    <p:spTree>
+      <p:nvGrpSpPr>
+        <p:cNvPr id="1" name=""/>
+        <p:cNvGrpSpPr/>
+        <p:nvPr/>
+      </p:nvGrpSpPr>
+      <p:grpSpPr>
+        <a:xfrm>
+          <a:off x="0" y="0"/>
+          <a:ext cx="0" cy="0"/>
+          <a:chOff x="0" y="0"/>
+          <a:chExt cx="0" cy="0"/>
+        </a:xfrm>
+      </p:grpSpPr>
+      <p:sp>
+        <p:nvSpPr>
+          <p:cNvPr id="45" name="PlaceHolder 1"/>
+          <p:cNvSpPr>
+            <a:spLocks noGrp="1"/>
+          </p:cNvSpPr>
+          <p:nvPr>
+            <p:ph type="title"/>
+          </p:nvPr>
+        </p:nvSpPr>
+        <p:spPr>
+          <a:xfrm>
+            <a:off x="504000" y="301320"/>
+            <a:ext cx="9071280" cy="1261800"/>
+          </a:xfrm>
+          <a:prstGeom prst="rect">
+            <a:avLst/>
+          </a:prstGeom>
+        </p:spPr>
+        <p:txBody>
+          <a:bodyPr lIns="0" rIns="0" tIns="0" bIns="0" anchor="ctr"/>
+          <a:p>
+            <a:pPr algn="ctr"/>
+            <a:endParaRPr b="0" lang="en-US" sz="4400" spc="-1" strike="noStrike">
+              <a:solidFill>
+                <a:srgbClr val="000000"/>
+              </a:solidFill>
+              <a:uFill>
+                <a:solidFill>
+                  <a:srgbClr val="ffffff"/>
+                </a:solidFill>
+              </a:uFill>
+              <a:latin typeface="Arial"/>
+            </a:endParaRPr>
+          </a:p>
+        </p:txBody>
+      </p:sp>
+    </p:spTree>
+  </p:cSld>
+</p:sldLayout>
+</file>
+
+<file path=ppt/slideLayouts/slideLayout18.xml><?xml version="1.0" encoding="utf-8"?>
+<p:sldLayout xmlns:a="http://schemas.openxmlformats.org/drawingml/2006/main" xmlns:p="http://schemas.openxmlformats.org/presentationml/2006/main" xmlns:r="http://schemas.openxmlformats.org/officeDocument/2006/relationships" xmlns:p14="http://schemas.microsoft.com/office/powerpoint/2010/main" xmlns:p15="http://schemas.microsoft.com/office/powerpoint/2012/main" xmlns:mc="http://schemas.openxmlformats.org/markup-compatibility/2006" type="objOnly" preserve="1">
+  <p:cSld name="Centered Text">
+    <p:spTree>
+      <p:nvGrpSpPr>
+        <p:cNvPr id="1" name=""/>
+        <p:cNvGrpSpPr/>
+        <p:nvPr/>
+      </p:nvGrpSpPr>
+      <p:grpSpPr>
+        <a:xfrm>
+          <a:off x="0" y="0"/>
+          <a:ext cx="0" cy="0"/>
+          <a:chOff x="0" y="0"/>
+          <a:chExt cx="0" cy="0"/>
+        </a:xfrm>
+      </p:grpSpPr>
+      <p:sp>
+        <p:nvSpPr>
+          <p:cNvPr id="46" name="PlaceHolder 1"/>
+          <p:cNvSpPr>
+            <a:spLocks noGrp="1"/>
+          </p:cNvSpPr>
+          <p:nvPr>
+            <p:ph type="subTitle"/>
+          </p:nvPr>
+        </p:nvSpPr>
+        <p:spPr>
+          <a:xfrm>
+            <a:off x="504000" y="301320"/>
+            <a:ext cx="9071280" cy="5850360"/>
+          </a:xfrm>
+          <a:prstGeom prst="rect">
+            <a:avLst/>
+          </a:prstGeom>
+        </p:spPr>
+        <p:txBody>
+          <a:bodyPr lIns="0" rIns="0" tIns="0" bIns="0" anchor="ctr"/>
+          <a:p>
+            <a:pPr algn="ctr"/>
+            <a:endParaRPr b="0" lang="en-US" sz="3200" spc="-1" strike="noStrike">
+              <a:solidFill>
+                <a:srgbClr val="000000"/>
+              </a:solidFill>
+              <a:uFill>
+                <a:solidFill>
+                  <a:srgbClr val="ffffff"/>
+                </a:solidFill>
+              </a:uFill>
+              <a:latin typeface="Arial"/>
+            </a:endParaRPr>
+          </a:p>
+        </p:txBody>
+      </p:sp>
+    </p:spTree>
+  </p:cSld>
+</p:sldLayout>
+</file>
+
+<file path=ppt/slideLayouts/slideLayout19.xml><?xml version="1.0" encoding="utf-8"?>
+<p:sldLayout xmlns:a="http://schemas.openxmlformats.org/drawingml/2006/main" xmlns:p="http://schemas.openxmlformats.org/presentationml/2006/main" xmlns:r="http://schemas.openxmlformats.org/officeDocument/2006/relationships" xmlns:p14="http://schemas.microsoft.com/office/powerpoint/2010/main" xmlns:p15="http://schemas.microsoft.com/office/powerpoint/2012/main" xmlns:mc="http://schemas.openxmlformats.org/markup-compatibility/2006" type="twoObjAndObj" preserve="1">
+  <p:cSld name="Title, 2 Content and Content">
+    <p:spTree>
+      <p:nvGrpSpPr>
+        <p:cNvPr id="1" name=""/>
+        <p:cNvGrpSpPr/>
+        <p:nvPr/>
+      </p:nvGrpSpPr>
+      <p:grpSpPr>
+        <a:xfrm>
+          <a:off x="0" y="0"/>
+          <a:ext cx="0" cy="0"/>
+          <a:chOff x="0" y="0"/>
+          <a:chExt cx="0" cy="0"/>
+        </a:xfrm>
+      </p:grpSpPr>
+      <p:sp>
+        <p:nvSpPr>
+          <p:cNvPr id="47" name="PlaceHolder 1"/>
+          <p:cNvSpPr>
+            <a:spLocks noGrp="1"/>
+          </p:cNvSpPr>
+          <p:nvPr>
+            <p:ph type="title"/>
+          </p:nvPr>
+        </p:nvSpPr>
+        <p:spPr>
+          <a:xfrm>
+            <a:off x="504000" y="301320"/>
+            <a:ext cx="9071280" cy="1261800"/>
+          </a:xfrm>
+          <a:prstGeom prst="rect">
+            <a:avLst/>
+          </a:prstGeom>
+        </p:spPr>
+        <p:txBody>
+          <a:bodyPr lIns="0" rIns="0" tIns="0" bIns="0" anchor="ctr"/>
+          <a:p>
+            <a:pPr algn="ctr"/>
+            <a:endParaRPr b="0" lang="en-US" sz="4400" spc="-1" strike="noStrike">
+              <a:solidFill>
+                <a:srgbClr val="000000"/>
+              </a:solidFill>
+              <a:uFill>
+                <a:solidFill>
+                  <a:srgbClr val="ffffff"/>
+                </a:solidFill>
+              </a:uFill>
+              <a:latin typeface="Arial"/>
+            </a:endParaRPr>
+          </a:p>
+        </p:txBody>
+      </p:sp>
+      <p:sp>
+        <p:nvSpPr>
+          <p:cNvPr id="48" name="PlaceHolder 2"/>
+          <p:cNvSpPr>
+            <a:spLocks noGrp="1"/>
+          </p:cNvSpPr>
+          <p:nvPr>
+            <p:ph type="body"/>
+          </p:nvPr>
+        </p:nvSpPr>
+        <p:spPr>
+          <a:xfrm>
+            <a:off x="504000" y="1769040"/>
+            <a:ext cx="4426560" cy="2090880"/>
+          </a:xfrm>
+          <a:prstGeom prst="rect">
+            <a:avLst/>
+          </a:prstGeom>
+        </p:spPr>
+        <p:txBody>
+          <a:bodyPr lIns="0" rIns="0" tIns="0" bIns="0"/>
+          <a:p>
+            <a:endParaRPr b="0" lang="en-US" sz="3200" spc="-1" strike="noStrike">
+              <a:solidFill>
+                <a:srgbClr val="000000"/>
+              </a:solidFill>
+              <a:uFill>
+                <a:solidFill>
+                  <a:srgbClr val="ffffff"/>
+                </a:solidFill>
+              </a:uFill>
+              <a:latin typeface="Arial"/>
+            </a:endParaRPr>
+          </a:p>
+        </p:txBody>
+      </p:sp>
+      <p:sp>
+        <p:nvSpPr>
+          <p:cNvPr id="49" name="PlaceHolder 3"/>
+          <p:cNvSpPr>
+            <a:spLocks noGrp="1"/>
+          </p:cNvSpPr>
+          <p:nvPr>
+            <p:ph type="body"/>
+          </p:nvPr>
+        </p:nvSpPr>
+        <p:spPr>
+          <a:xfrm>
+            <a:off x="504000" y="4059000"/>
+            <a:ext cx="4426560" cy="2090880"/>
+          </a:xfrm>
+          <a:prstGeom prst="rect">
+            <a:avLst/>
+          </a:prstGeom>
+        </p:spPr>
+        <p:txBody>
+          <a:bodyPr lIns="0" rIns="0" tIns="0" bIns="0"/>
+          <a:p>
+            <a:endParaRPr b="0" lang="en-US" sz="3200" spc="-1" strike="noStrike">
+              <a:solidFill>
+                <a:srgbClr val="000000"/>
+              </a:solidFill>
+              <a:uFill>
+                <a:solidFill>
+                  <a:srgbClr val="ffffff"/>
+                </a:solidFill>
+              </a:uFill>
+              <a:latin typeface="Arial"/>
+            </a:endParaRPr>
+          </a:p>
+        </p:txBody>
+      </p:sp>
+      <p:sp>
+        <p:nvSpPr>
+          <p:cNvPr id="50" name="PlaceHolder 4"/>
+          <p:cNvSpPr>
+            <a:spLocks noGrp="1"/>
+          </p:cNvSpPr>
+          <p:nvPr>
+            <p:ph type="body"/>
+          </p:nvPr>
+        </p:nvSpPr>
+        <p:spPr>
+          <a:xfrm>
+            <a:off x="5152320" y="1769040"/>
+            <a:ext cx="4426560" cy="4384080"/>
+          </a:xfrm>
+          <a:prstGeom prst="rect">
+            <a:avLst/>
+          </a:prstGeom>
+        </p:spPr>
+        <p:txBody>
+          <a:bodyPr lIns="0" rIns="0" tIns="0" bIns="0"/>
+          <a:p>
+            <a:endParaRPr b="0" lang="en-US" sz="3200" spc="-1" strike="noStrike">
+              <a:solidFill>
+                <a:srgbClr val="000000"/>
+              </a:solidFill>
+              <a:uFill>
+                <a:solidFill>
+                  <a:srgbClr val="ffffff"/>
+                </a:solidFill>
+              </a:uFill>
+              <a:latin typeface="Arial"/>
+            </a:endParaRPr>
+          </a:p>
+        </p:txBody>
+      </p:sp>
     </p:spTree>
   </p:cSld>
 </p:sldLayout>
@@ -1078,7 +1666,7 @@
       </p:grpSpPr>
       <p:sp>
         <p:nvSpPr>
-          <p:cNvPr id="5" name="PlaceHolder 1"/>
+          <p:cNvPr id="2" name="PlaceHolder 1"/>
           <p:cNvSpPr>
             <a:spLocks noGrp="1"/>
           </p:cNvSpPr>
@@ -1089,7 +1677,7 @@
         <p:spPr>
           <a:xfrm>
             <a:off x="504000" y="301320"/>
-            <a:ext cx="9071640" cy="1262160"/>
+            <a:ext cx="9071280" cy="1261800"/>
           </a:xfrm>
           <a:prstGeom prst="rect">
             <a:avLst/>
@@ -1115,7 +1703,7 @@
       </p:sp>
       <p:sp>
         <p:nvSpPr>
-          <p:cNvPr id="6" name="PlaceHolder 2"/>
+          <p:cNvPr id="3" name="PlaceHolder 2"/>
           <p:cNvSpPr>
             <a:spLocks noGrp="1"/>
           </p:cNvSpPr>
@@ -1126,7 +1714,7 @@
         <p:spPr>
           <a:xfrm>
             <a:off x="504000" y="1769040"/>
-            <a:ext cx="9071640" cy="4384440"/>
+            <a:ext cx="9071280" cy="4384080"/>
           </a:xfrm>
           <a:prstGeom prst="rect">
             <a:avLst/>
@@ -1150,6 +1738,851 @@
           </a:p>
         </p:txBody>
       </p:sp>
+    </p:spTree>
+  </p:cSld>
+</p:sldLayout>
+</file>
+
+<file path=ppt/slideLayouts/slideLayout20.xml><?xml version="1.0" encoding="utf-8"?>
+<p:sldLayout xmlns:a="http://schemas.openxmlformats.org/drawingml/2006/main" xmlns:p="http://schemas.openxmlformats.org/presentationml/2006/main" xmlns:r="http://schemas.openxmlformats.org/officeDocument/2006/relationships" xmlns:p14="http://schemas.microsoft.com/office/powerpoint/2010/main" xmlns:p15="http://schemas.microsoft.com/office/powerpoint/2012/main" xmlns:mc="http://schemas.openxmlformats.org/markup-compatibility/2006" type="objAndTwoObj" preserve="1">
+  <p:cSld name="Title Content and 2 Content">
+    <p:spTree>
+      <p:nvGrpSpPr>
+        <p:cNvPr id="1" name=""/>
+        <p:cNvGrpSpPr/>
+        <p:nvPr/>
+      </p:nvGrpSpPr>
+      <p:grpSpPr>
+        <a:xfrm>
+          <a:off x="0" y="0"/>
+          <a:ext cx="0" cy="0"/>
+          <a:chOff x="0" y="0"/>
+          <a:chExt cx="0" cy="0"/>
+        </a:xfrm>
+      </p:grpSpPr>
+      <p:sp>
+        <p:nvSpPr>
+          <p:cNvPr id="51" name="PlaceHolder 1"/>
+          <p:cNvSpPr>
+            <a:spLocks noGrp="1"/>
+          </p:cNvSpPr>
+          <p:nvPr>
+            <p:ph type="title"/>
+          </p:nvPr>
+        </p:nvSpPr>
+        <p:spPr>
+          <a:xfrm>
+            <a:off x="504000" y="301320"/>
+            <a:ext cx="9071280" cy="1261800"/>
+          </a:xfrm>
+          <a:prstGeom prst="rect">
+            <a:avLst/>
+          </a:prstGeom>
+        </p:spPr>
+        <p:txBody>
+          <a:bodyPr lIns="0" rIns="0" tIns="0" bIns="0" anchor="ctr"/>
+          <a:p>
+            <a:pPr algn="ctr"/>
+            <a:endParaRPr b="0" lang="en-US" sz="4400" spc="-1" strike="noStrike">
+              <a:solidFill>
+                <a:srgbClr val="000000"/>
+              </a:solidFill>
+              <a:uFill>
+                <a:solidFill>
+                  <a:srgbClr val="ffffff"/>
+                </a:solidFill>
+              </a:uFill>
+              <a:latin typeface="Arial"/>
+            </a:endParaRPr>
+          </a:p>
+        </p:txBody>
+      </p:sp>
+      <p:sp>
+        <p:nvSpPr>
+          <p:cNvPr id="52" name="PlaceHolder 2"/>
+          <p:cNvSpPr>
+            <a:spLocks noGrp="1"/>
+          </p:cNvSpPr>
+          <p:nvPr>
+            <p:ph type="body"/>
+          </p:nvPr>
+        </p:nvSpPr>
+        <p:spPr>
+          <a:xfrm>
+            <a:off x="504000" y="1769040"/>
+            <a:ext cx="4426560" cy="4384080"/>
+          </a:xfrm>
+          <a:prstGeom prst="rect">
+            <a:avLst/>
+          </a:prstGeom>
+        </p:spPr>
+        <p:txBody>
+          <a:bodyPr lIns="0" rIns="0" tIns="0" bIns="0"/>
+          <a:p>
+            <a:endParaRPr b="0" lang="en-US" sz="3200" spc="-1" strike="noStrike">
+              <a:solidFill>
+                <a:srgbClr val="000000"/>
+              </a:solidFill>
+              <a:uFill>
+                <a:solidFill>
+                  <a:srgbClr val="ffffff"/>
+                </a:solidFill>
+              </a:uFill>
+              <a:latin typeface="Arial"/>
+            </a:endParaRPr>
+          </a:p>
+        </p:txBody>
+      </p:sp>
+      <p:sp>
+        <p:nvSpPr>
+          <p:cNvPr id="53" name="PlaceHolder 3"/>
+          <p:cNvSpPr>
+            <a:spLocks noGrp="1"/>
+          </p:cNvSpPr>
+          <p:nvPr>
+            <p:ph type="body"/>
+          </p:nvPr>
+        </p:nvSpPr>
+        <p:spPr>
+          <a:xfrm>
+            <a:off x="5152320" y="1769040"/>
+            <a:ext cx="4426560" cy="2090880"/>
+          </a:xfrm>
+          <a:prstGeom prst="rect">
+            <a:avLst/>
+          </a:prstGeom>
+        </p:spPr>
+        <p:txBody>
+          <a:bodyPr lIns="0" rIns="0" tIns="0" bIns="0"/>
+          <a:p>
+            <a:endParaRPr b="0" lang="en-US" sz="3200" spc="-1" strike="noStrike">
+              <a:solidFill>
+                <a:srgbClr val="000000"/>
+              </a:solidFill>
+              <a:uFill>
+                <a:solidFill>
+                  <a:srgbClr val="ffffff"/>
+                </a:solidFill>
+              </a:uFill>
+              <a:latin typeface="Arial"/>
+            </a:endParaRPr>
+          </a:p>
+        </p:txBody>
+      </p:sp>
+      <p:sp>
+        <p:nvSpPr>
+          <p:cNvPr id="54" name="PlaceHolder 4"/>
+          <p:cNvSpPr>
+            <a:spLocks noGrp="1"/>
+          </p:cNvSpPr>
+          <p:nvPr>
+            <p:ph type="body"/>
+          </p:nvPr>
+        </p:nvSpPr>
+        <p:spPr>
+          <a:xfrm>
+            <a:off x="5152320" y="4059000"/>
+            <a:ext cx="4426560" cy="2090880"/>
+          </a:xfrm>
+          <a:prstGeom prst="rect">
+            <a:avLst/>
+          </a:prstGeom>
+        </p:spPr>
+        <p:txBody>
+          <a:bodyPr lIns="0" rIns="0" tIns="0" bIns="0"/>
+          <a:p>
+            <a:endParaRPr b="0" lang="en-US" sz="3200" spc="-1" strike="noStrike">
+              <a:solidFill>
+                <a:srgbClr val="000000"/>
+              </a:solidFill>
+              <a:uFill>
+                <a:solidFill>
+                  <a:srgbClr val="ffffff"/>
+                </a:solidFill>
+              </a:uFill>
+              <a:latin typeface="Arial"/>
+            </a:endParaRPr>
+          </a:p>
+        </p:txBody>
+      </p:sp>
+    </p:spTree>
+  </p:cSld>
+</p:sldLayout>
+</file>
+
+<file path=ppt/slideLayouts/slideLayout21.xml><?xml version="1.0" encoding="utf-8"?>
+<p:sldLayout xmlns:a="http://schemas.openxmlformats.org/drawingml/2006/main" xmlns:p="http://schemas.openxmlformats.org/presentationml/2006/main" xmlns:r="http://schemas.openxmlformats.org/officeDocument/2006/relationships" xmlns:p14="http://schemas.microsoft.com/office/powerpoint/2010/main" xmlns:p15="http://schemas.microsoft.com/office/powerpoint/2012/main" xmlns:mc="http://schemas.openxmlformats.org/markup-compatibility/2006" type="twoObjOverTx" preserve="1">
+  <p:cSld name="Title, 2 Content over Content">
+    <p:spTree>
+      <p:nvGrpSpPr>
+        <p:cNvPr id="1" name=""/>
+        <p:cNvGrpSpPr/>
+        <p:nvPr/>
+      </p:nvGrpSpPr>
+      <p:grpSpPr>
+        <a:xfrm>
+          <a:off x="0" y="0"/>
+          <a:ext cx="0" cy="0"/>
+          <a:chOff x="0" y="0"/>
+          <a:chExt cx="0" cy="0"/>
+        </a:xfrm>
+      </p:grpSpPr>
+      <p:sp>
+        <p:nvSpPr>
+          <p:cNvPr id="55" name="PlaceHolder 1"/>
+          <p:cNvSpPr>
+            <a:spLocks noGrp="1"/>
+          </p:cNvSpPr>
+          <p:nvPr>
+            <p:ph type="title"/>
+          </p:nvPr>
+        </p:nvSpPr>
+        <p:spPr>
+          <a:xfrm>
+            <a:off x="504000" y="301320"/>
+            <a:ext cx="9071280" cy="1261800"/>
+          </a:xfrm>
+          <a:prstGeom prst="rect">
+            <a:avLst/>
+          </a:prstGeom>
+        </p:spPr>
+        <p:txBody>
+          <a:bodyPr lIns="0" rIns="0" tIns="0" bIns="0" anchor="ctr"/>
+          <a:p>
+            <a:pPr algn="ctr"/>
+            <a:endParaRPr b="0" lang="en-US" sz="4400" spc="-1" strike="noStrike">
+              <a:solidFill>
+                <a:srgbClr val="000000"/>
+              </a:solidFill>
+              <a:uFill>
+                <a:solidFill>
+                  <a:srgbClr val="ffffff"/>
+                </a:solidFill>
+              </a:uFill>
+              <a:latin typeface="Arial"/>
+            </a:endParaRPr>
+          </a:p>
+        </p:txBody>
+      </p:sp>
+      <p:sp>
+        <p:nvSpPr>
+          <p:cNvPr id="56" name="PlaceHolder 2"/>
+          <p:cNvSpPr>
+            <a:spLocks noGrp="1"/>
+          </p:cNvSpPr>
+          <p:nvPr>
+            <p:ph type="body"/>
+          </p:nvPr>
+        </p:nvSpPr>
+        <p:spPr>
+          <a:xfrm>
+            <a:off x="504000" y="1769040"/>
+            <a:ext cx="4426560" cy="2090880"/>
+          </a:xfrm>
+          <a:prstGeom prst="rect">
+            <a:avLst/>
+          </a:prstGeom>
+        </p:spPr>
+        <p:txBody>
+          <a:bodyPr lIns="0" rIns="0" tIns="0" bIns="0"/>
+          <a:p>
+            <a:endParaRPr b="0" lang="en-US" sz="3200" spc="-1" strike="noStrike">
+              <a:solidFill>
+                <a:srgbClr val="000000"/>
+              </a:solidFill>
+              <a:uFill>
+                <a:solidFill>
+                  <a:srgbClr val="ffffff"/>
+                </a:solidFill>
+              </a:uFill>
+              <a:latin typeface="Arial"/>
+            </a:endParaRPr>
+          </a:p>
+        </p:txBody>
+      </p:sp>
+      <p:sp>
+        <p:nvSpPr>
+          <p:cNvPr id="57" name="PlaceHolder 3"/>
+          <p:cNvSpPr>
+            <a:spLocks noGrp="1"/>
+          </p:cNvSpPr>
+          <p:nvPr>
+            <p:ph type="body"/>
+          </p:nvPr>
+        </p:nvSpPr>
+        <p:spPr>
+          <a:xfrm>
+            <a:off x="5152320" y="1769040"/>
+            <a:ext cx="4426560" cy="2090880"/>
+          </a:xfrm>
+          <a:prstGeom prst="rect">
+            <a:avLst/>
+          </a:prstGeom>
+        </p:spPr>
+        <p:txBody>
+          <a:bodyPr lIns="0" rIns="0" tIns="0" bIns="0"/>
+          <a:p>
+            <a:endParaRPr b="0" lang="en-US" sz="3200" spc="-1" strike="noStrike">
+              <a:solidFill>
+                <a:srgbClr val="000000"/>
+              </a:solidFill>
+              <a:uFill>
+                <a:solidFill>
+                  <a:srgbClr val="ffffff"/>
+                </a:solidFill>
+              </a:uFill>
+              <a:latin typeface="Arial"/>
+            </a:endParaRPr>
+          </a:p>
+        </p:txBody>
+      </p:sp>
+      <p:sp>
+        <p:nvSpPr>
+          <p:cNvPr id="58" name="PlaceHolder 4"/>
+          <p:cNvSpPr>
+            <a:spLocks noGrp="1"/>
+          </p:cNvSpPr>
+          <p:nvPr>
+            <p:ph type="body"/>
+          </p:nvPr>
+        </p:nvSpPr>
+        <p:spPr>
+          <a:xfrm>
+            <a:off x="504000" y="4059000"/>
+            <a:ext cx="9071280" cy="2090880"/>
+          </a:xfrm>
+          <a:prstGeom prst="rect">
+            <a:avLst/>
+          </a:prstGeom>
+        </p:spPr>
+        <p:txBody>
+          <a:bodyPr lIns="0" rIns="0" tIns="0" bIns="0"/>
+          <a:p>
+            <a:endParaRPr b="0" lang="en-US" sz="3200" spc="-1" strike="noStrike">
+              <a:solidFill>
+                <a:srgbClr val="000000"/>
+              </a:solidFill>
+              <a:uFill>
+                <a:solidFill>
+                  <a:srgbClr val="ffffff"/>
+                </a:solidFill>
+              </a:uFill>
+              <a:latin typeface="Arial"/>
+            </a:endParaRPr>
+          </a:p>
+        </p:txBody>
+      </p:sp>
+    </p:spTree>
+  </p:cSld>
+</p:sldLayout>
+</file>
+
+<file path=ppt/slideLayouts/slideLayout22.xml><?xml version="1.0" encoding="utf-8"?>
+<p:sldLayout xmlns:a="http://schemas.openxmlformats.org/drawingml/2006/main" xmlns:p="http://schemas.openxmlformats.org/presentationml/2006/main" xmlns:r="http://schemas.openxmlformats.org/officeDocument/2006/relationships" xmlns:p14="http://schemas.microsoft.com/office/powerpoint/2010/main" xmlns:p15="http://schemas.microsoft.com/office/powerpoint/2012/main" xmlns:mc="http://schemas.openxmlformats.org/markup-compatibility/2006" type="objOverTx" preserve="1">
+  <p:cSld name="Title, Content over Content">
+    <p:spTree>
+      <p:nvGrpSpPr>
+        <p:cNvPr id="1" name=""/>
+        <p:cNvGrpSpPr/>
+        <p:nvPr/>
+      </p:nvGrpSpPr>
+      <p:grpSpPr>
+        <a:xfrm>
+          <a:off x="0" y="0"/>
+          <a:ext cx="0" cy="0"/>
+          <a:chOff x="0" y="0"/>
+          <a:chExt cx="0" cy="0"/>
+        </a:xfrm>
+      </p:grpSpPr>
+      <p:sp>
+        <p:nvSpPr>
+          <p:cNvPr id="59" name="PlaceHolder 1"/>
+          <p:cNvSpPr>
+            <a:spLocks noGrp="1"/>
+          </p:cNvSpPr>
+          <p:nvPr>
+            <p:ph type="title"/>
+          </p:nvPr>
+        </p:nvSpPr>
+        <p:spPr>
+          <a:xfrm>
+            <a:off x="504000" y="301320"/>
+            <a:ext cx="9071280" cy="1261800"/>
+          </a:xfrm>
+          <a:prstGeom prst="rect">
+            <a:avLst/>
+          </a:prstGeom>
+        </p:spPr>
+        <p:txBody>
+          <a:bodyPr lIns="0" rIns="0" tIns="0" bIns="0" anchor="ctr"/>
+          <a:p>
+            <a:pPr algn="ctr"/>
+            <a:endParaRPr b="0" lang="en-US" sz="4400" spc="-1" strike="noStrike">
+              <a:solidFill>
+                <a:srgbClr val="000000"/>
+              </a:solidFill>
+              <a:uFill>
+                <a:solidFill>
+                  <a:srgbClr val="ffffff"/>
+                </a:solidFill>
+              </a:uFill>
+              <a:latin typeface="Arial"/>
+            </a:endParaRPr>
+          </a:p>
+        </p:txBody>
+      </p:sp>
+      <p:sp>
+        <p:nvSpPr>
+          <p:cNvPr id="60" name="PlaceHolder 2"/>
+          <p:cNvSpPr>
+            <a:spLocks noGrp="1"/>
+          </p:cNvSpPr>
+          <p:nvPr>
+            <p:ph type="body"/>
+          </p:nvPr>
+        </p:nvSpPr>
+        <p:spPr>
+          <a:xfrm>
+            <a:off x="504000" y="1769040"/>
+            <a:ext cx="9071280" cy="2090880"/>
+          </a:xfrm>
+          <a:prstGeom prst="rect">
+            <a:avLst/>
+          </a:prstGeom>
+        </p:spPr>
+        <p:txBody>
+          <a:bodyPr lIns="0" rIns="0" tIns="0" bIns="0"/>
+          <a:p>
+            <a:endParaRPr b="0" lang="en-US" sz="3200" spc="-1" strike="noStrike">
+              <a:solidFill>
+                <a:srgbClr val="000000"/>
+              </a:solidFill>
+              <a:uFill>
+                <a:solidFill>
+                  <a:srgbClr val="ffffff"/>
+                </a:solidFill>
+              </a:uFill>
+              <a:latin typeface="Arial"/>
+            </a:endParaRPr>
+          </a:p>
+        </p:txBody>
+      </p:sp>
+      <p:sp>
+        <p:nvSpPr>
+          <p:cNvPr id="61" name="PlaceHolder 3"/>
+          <p:cNvSpPr>
+            <a:spLocks noGrp="1"/>
+          </p:cNvSpPr>
+          <p:nvPr>
+            <p:ph type="body"/>
+          </p:nvPr>
+        </p:nvSpPr>
+        <p:spPr>
+          <a:xfrm>
+            <a:off x="504000" y="4059000"/>
+            <a:ext cx="9071280" cy="2090880"/>
+          </a:xfrm>
+          <a:prstGeom prst="rect">
+            <a:avLst/>
+          </a:prstGeom>
+        </p:spPr>
+        <p:txBody>
+          <a:bodyPr lIns="0" rIns="0" tIns="0" bIns="0"/>
+          <a:p>
+            <a:endParaRPr b="0" lang="en-US" sz="3200" spc="-1" strike="noStrike">
+              <a:solidFill>
+                <a:srgbClr val="000000"/>
+              </a:solidFill>
+              <a:uFill>
+                <a:solidFill>
+                  <a:srgbClr val="ffffff"/>
+                </a:solidFill>
+              </a:uFill>
+              <a:latin typeface="Arial"/>
+            </a:endParaRPr>
+          </a:p>
+        </p:txBody>
+      </p:sp>
+    </p:spTree>
+  </p:cSld>
+</p:sldLayout>
+</file>
+
+<file path=ppt/slideLayouts/slideLayout23.xml><?xml version="1.0" encoding="utf-8"?>
+<p:sldLayout xmlns:a="http://schemas.openxmlformats.org/drawingml/2006/main" xmlns:p="http://schemas.openxmlformats.org/presentationml/2006/main" xmlns:r="http://schemas.openxmlformats.org/officeDocument/2006/relationships" xmlns:p14="http://schemas.microsoft.com/office/powerpoint/2010/main" xmlns:p15="http://schemas.microsoft.com/office/powerpoint/2012/main" xmlns:mc="http://schemas.openxmlformats.org/markup-compatibility/2006" type="fourObj" preserve="1">
+  <p:cSld name="Title, 4 Content">
+    <p:spTree>
+      <p:nvGrpSpPr>
+        <p:cNvPr id="1" name=""/>
+        <p:cNvGrpSpPr/>
+        <p:nvPr/>
+      </p:nvGrpSpPr>
+      <p:grpSpPr>
+        <a:xfrm>
+          <a:off x="0" y="0"/>
+          <a:ext cx="0" cy="0"/>
+          <a:chOff x="0" y="0"/>
+          <a:chExt cx="0" cy="0"/>
+        </a:xfrm>
+      </p:grpSpPr>
+      <p:sp>
+        <p:nvSpPr>
+          <p:cNvPr id="62" name="PlaceHolder 1"/>
+          <p:cNvSpPr>
+            <a:spLocks noGrp="1"/>
+          </p:cNvSpPr>
+          <p:nvPr>
+            <p:ph type="title"/>
+          </p:nvPr>
+        </p:nvSpPr>
+        <p:spPr>
+          <a:xfrm>
+            <a:off x="504000" y="301320"/>
+            <a:ext cx="9071280" cy="1261800"/>
+          </a:xfrm>
+          <a:prstGeom prst="rect">
+            <a:avLst/>
+          </a:prstGeom>
+        </p:spPr>
+        <p:txBody>
+          <a:bodyPr lIns="0" rIns="0" tIns="0" bIns="0" anchor="ctr"/>
+          <a:p>
+            <a:pPr algn="ctr"/>
+            <a:endParaRPr b="0" lang="en-US" sz="4400" spc="-1" strike="noStrike">
+              <a:solidFill>
+                <a:srgbClr val="000000"/>
+              </a:solidFill>
+              <a:uFill>
+                <a:solidFill>
+                  <a:srgbClr val="ffffff"/>
+                </a:solidFill>
+              </a:uFill>
+              <a:latin typeface="Arial"/>
+            </a:endParaRPr>
+          </a:p>
+        </p:txBody>
+      </p:sp>
+      <p:sp>
+        <p:nvSpPr>
+          <p:cNvPr id="63" name="PlaceHolder 2"/>
+          <p:cNvSpPr>
+            <a:spLocks noGrp="1"/>
+          </p:cNvSpPr>
+          <p:nvPr>
+            <p:ph type="body"/>
+          </p:nvPr>
+        </p:nvSpPr>
+        <p:spPr>
+          <a:xfrm>
+            <a:off x="504000" y="1769040"/>
+            <a:ext cx="4426560" cy="2090880"/>
+          </a:xfrm>
+          <a:prstGeom prst="rect">
+            <a:avLst/>
+          </a:prstGeom>
+        </p:spPr>
+        <p:txBody>
+          <a:bodyPr lIns="0" rIns="0" tIns="0" bIns="0"/>
+          <a:p>
+            <a:endParaRPr b="0" lang="en-US" sz="3200" spc="-1" strike="noStrike">
+              <a:solidFill>
+                <a:srgbClr val="000000"/>
+              </a:solidFill>
+              <a:uFill>
+                <a:solidFill>
+                  <a:srgbClr val="ffffff"/>
+                </a:solidFill>
+              </a:uFill>
+              <a:latin typeface="Arial"/>
+            </a:endParaRPr>
+          </a:p>
+        </p:txBody>
+      </p:sp>
+      <p:sp>
+        <p:nvSpPr>
+          <p:cNvPr id="64" name="PlaceHolder 3"/>
+          <p:cNvSpPr>
+            <a:spLocks noGrp="1"/>
+          </p:cNvSpPr>
+          <p:nvPr>
+            <p:ph type="body"/>
+          </p:nvPr>
+        </p:nvSpPr>
+        <p:spPr>
+          <a:xfrm>
+            <a:off x="5152320" y="1769040"/>
+            <a:ext cx="4426560" cy="2090880"/>
+          </a:xfrm>
+          <a:prstGeom prst="rect">
+            <a:avLst/>
+          </a:prstGeom>
+        </p:spPr>
+        <p:txBody>
+          <a:bodyPr lIns="0" rIns="0" tIns="0" bIns="0"/>
+          <a:p>
+            <a:endParaRPr b="0" lang="en-US" sz="3200" spc="-1" strike="noStrike">
+              <a:solidFill>
+                <a:srgbClr val="000000"/>
+              </a:solidFill>
+              <a:uFill>
+                <a:solidFill>
+                  <a:srgbClr val="ffffff"/>
+                </a:solidFill>
+              </a:uFill>
+              <a:latin typeface="Arial"/>
+            </a:endParaRPr>
+          </a:p>
+        </p:txBody>
+      </p:sp>
+      <p:sp>
+        <p:nvSpPr>
+          <p:cNvPr id="65" name="PlaceHolder 4"/>
+          <p:cNvSpPr>
+            <a:spLocks noGrp="1"/>
+          </p:cNvSpPr>
+          <p:nvPr>
+            <p:ph type="body"/>
+          </p:nvPr>
+        </p:nvSpPr>
+        <p:spPr>
+          <a:xfrm>
+            <a:off x="5152320" y="4059000"/>
+            <a:ext cx="4426560" cy="2090880"/>
+          </a:xfrm>
+          <a:prstGeom prst="rect">
+            <a:avLst/>
+          </a:prstGeom>
+        </p:spPr>
+        <p:txBody>
+          <a:bodyPr lIns="0" rIns="0" tIns="0" bIns="0"/>
+          <a:p>
+            <a:endParaRPr b="0" lang="en-US" sz="3200" spc="-1" strike="noStrike">
+              <a:solidFill>
+                <a:srgbClr val="000000"/>
+              </a:solidFill>
+              <a:uFill>
+                <a:solidFill>
+                  <a:srgbClr val="ffffff"/>
+                </a:solidFill>
+              </a:uFill>
+              <a:latin typeface="Arial"/>
+            </a:endParaRPr>
+          </a:p>
+        </p:txBody>
+      </p:sp>
+      <p:sp>
+        <p:nvSpPr>
+          <p:cNvPr id="66" name="PlaceHolder 5"/>
+          <p:cNvSpPr>
+            <a:spLocks noGrp="1"/>
+          </p:cNvSpPr>
+          <p:nvPr>
+            <p:ph type="body"/>
+          </p:nvPr>
+        </p:nvSpPr>
+        <p:spPr>
+          <a:xfrm>
+            <a:off x="504000" y="4059000"/>
+            <a:ext cx="4426560" cy="2090880"/>
+          </a:xfrm>
+          <a:prstGeom prst="rect">
+            <a:avLst/>
+          </a:prstGeom>
+        </p:spPr>
+        <p:txBody>
+          <a:bodyPr lIns="0" rIns="0" tIns="0" bIns="0"/>
+          <a:p>
+            <a:endParaRPr b="0" lang="en-US" sz="3200" spc="-1" strike="noStrike">
+              <a:solidFill>
+                <a:srgbClr val="000000"/>
+              </a:solidFill>
+              <a:uFill>
+                <a:solidFill>
+                  <a:srgbClr val="ffffff"/>
+                </a:solidFill>
+              </a:uFill>
+              <a:latin typeface="Arial"/>
+            </a:endParaRPr>
+          </a:p>
+        </p:txBody>
+      </p:sp>
+    </p:spTree>
+  </p:cSld>
+</p:sldLayout>
+</file>
+
+<file path=ppt/slideLayouts/slideLayout24.xml><?xml version="1.0" encoding="utf-8"?>
+<p:sldLayout xmlns:a="http://schemas.openxmlformats.org/drawingml/2006/main" xmlns:p="http://schemas.openxmlformats.org/presentationml/2006/main" xmlns:r="http://schemas.openxmlformats.org/officeDocument/2006/relationships" xmlns:p14="http://schemas.microsoft.com/office/powerpoint/2010/main" xmlns:p15="http://schemas.microsoft.com/office/powerpoint/2012/main" xmlns:mc="http://schemas.openxmlformats.org/markup-compatibility/2006" type="blank" preserve="1">
+  <p:cSld name="Title, 6 Content">
+    <p:spTree>
+      <p:nvGrpSpPr>
+        <p:cNvPr id="1" name=""/>
+        <p:cNvGrpSpPr/>
+        <p:nvPr/>
+      </p:nvGrpSpPr>
+      <p:grpSpPr>
+        <a:xfrm>
+          <a:off x="0" y="0"/>
+          <a:ext cx="0" cy="0"/>
+          <a:chOff x="0" y="0"/>
+          <a:chExt cx="0" cy="0"/>
+        </a:xfrm>
+      </p:grpSpPr>
+      <p:sp>
+        <p:nvSpPr>
+          <p:cNvPr id="67" name="PlaceHolder 1"/>
+          <p:cNvSpPr>
+            <a:spLocks noGrp="1"/>
+          </p:cNvSpPr>
+          <p:nvPr>
+            <p:ph type="title"/>
+          </p:nvPr>
+        </p:nvSpPr>
+        <p:spPr>
+          <a:xfrm>
+            <a:off x="504000" y="301320"/>
+            <a:ext cx="9071280" cy="1261800"/>
+          </a:xfrm>
+          <a:prstGeom prst="rect">
+            <a:avLst/>
+          </a:prstGeom>
+        </p:spPr>
+        <p:txBody>
+          <a:bodyPr lIns="0" rIns="0" tIns="0" bIns="0" anchor="ctr"/>
+          <a:p>
+            <a:pPr algn="ctr"/>
+            <a:endParaRPr b="0" lang="en-US" sz="4400" spc="-1" strike="noStrike">
+              <a:solidFill>
+                <a:srgbClr val="000000"/>
+              </a:solidFill>
+              <a:uFill>
+                <a:solidFill>
+                  <a:srgbClr val="ffffff"/>
+                </a:solidFill>
+              </a:uFill>
+              <a:latin typeface="Arial"/>
+            </a:endParaRPr>
+          </a:p>
+        </p:txBody>
+      </p:sp>
+      <p:sp>
+        <p:nvSpPr>
+          <p:cNvPr id="68" name="PlaceHolder 2"/>
+          <p:cNvSpPr>
+            <a:spLocks noGrp="1"/>
+          </p:cNvSpPr>
+          <p:nvPr>
+            <p:ph type="body"/>
+          </p:nvPr>
+        </p:nvSpPr>
+        <p:spPr>
+          <a:xfrm>
+            <a:off x="504000" y="1769040"/>
+            <a:ext cx="9071280" cy="4384080"/>
+          </a:xfrm>
+          <a:prstGeom prst="rect">
+            <a:avLst/>
+          </a:prstGeom>
+        </p:spPr>
+        <p:txBody>
+          <a:bodyPr lIns="0" rIns="0" tIns="0" bIns="0"/>
+          <a:p>
+            <a:endParaRPr b="0" lang="en-US" sz="3200" spc="-1" strike="noStrike">
+              <a:solidFill>
+                <a:srgbClr val="000000"/>
+              </a:solidFill>
+              <a:uFill>
+                <a:solidFill>
+                  <a:srgbClr val="ffffff"/>
+                </a:solidFill>
+              </a:uFill>
+              <a:latin typeface="Arial"/>
+            </a:endParaRPr>
+          </a:p>
+        </p:txBody>
+      </p:sp>
+      <p:sp>
+        <p:nvSpPr>
+          <p:cNvPr id="69" name="PlaceHolder 3"/>
+          <p:cNvSpPr>
+            <a:spLocks noGrp="1"/>
+          </p:cNvSpPr>
+          <p:nvPr>
+            <p:ph type="body"/>
+          </p:nvPr>
+        </p:nvSpPr>
+        <p:spPr>
+          <a:xfrm>
+            <a:off x="504000" y="1769040"/>
+            <a:ext cx="9071280" cy="4384080"/>
+          </a:xfrm>
+          <a:prstGeom prst="rect">
+            <a:avLst/>
+          </a:prstGeom>
+        </p:spPr>
+        <p:txBody>
+          <a:bodyPr lIns="0" rIns="0" tIns="0" bIns="0"/>
+          <a:p>
+            <a:endParaRPr b="0" lang="en-US" sz="3200" spc="-1" strike="noStrike">
+              <a:solidFill>
+                <a:srgbClr val="000000"/>
+              </a:solidFill>
+              <a:uFill>
+                <a:solidFill>
+                  <a:srgbClr val="ffffff"/>
+                </a:solidFill>
+              </a:uFill>
+              <a:latin typeface="Arial"/>
+            </a:endParaRPr>
+          </a:p>
+        </p:txBody>
+      </p:sp>
+      <p:pic>
+        <p:nvPicPr>
+          <p:cNvPr id="70" name="" descr=""/>
+          <p:cNvPicPr/>
+          <p:nvPr/>
+        </p:nvPicPr>
+        <p:blipFill>
+          <a:blip r:embed="rId2"/>
+          <a:stretch/>
+        </p:blipFill>
+        <p:spPr>
+          <a:xfrm>
+            <a:off x="2292120" y="1769040"/>
+            <a:ext cx="5494680" cy="4384080"/>
+          </a:xfrm>
+          <a:prstGeom prst="rect">
+            <a:avLst/>
+          </a:prstGeom>
+          <a:ln>
+            <a:noFill/>
+          </a:ln>
+        </p:spPr>
+      </p:pic>
+      <p:pic>
+        <p:nvPicPr>
+          <p:cNvPr id="71" name="" descr=""/>
+          <p:cNvPicPr/>
+          <p:nvPr/>
+        </p:nvPicPr>
+        <p:blipFill>
+          <a:blip r:embed="rId3"/>
+          <a:stretch/>
+        </p:blipFill>
+        <p:spPr>
+          <a:xfrm>
+            <a:off x="2292120" y="1769040"/>
+            <a:ext cx="5494680" cy="4384080"/>
+          </a:xfrm>
+          <a:prstGeom prst="rect">
+            <a:avLst/>
+          </a:prstGeom>
+          <a:ln>
+            <a:noFill/>
+          </a:ln>
+        </p:spPr>
+      </p:pic>
     </p:spTree>
   </p:cSld>
 </p:sldLayout>
@@ -1174,7 +2607,7 @@
       </p:grpSpPr>
       <p:sp>
         <p:nvSpPr>
-          <p:cNvPr id="7" name="PlaceHolder 1"/>
+          <p:cNvPr id="4" name="PlaceHolder 1"/>
           <p:cNvSpPr>
             <a:spLocks noGrp="1"/>
           </p:cNvSpPr>
@@ -1185,7 +2618,7 @@
         <p:spPr>
           <a:xfrm>
             <a:off x="504000" y="301320"/>
-            <a:ext cx="9071640" cy="1262160"/>
+            <a:ext cx="9071280" cy="1261800"/>
           </a:xfrm>
           <a:prstGeom prst="rect">
             <a:avLst/>
@@ -1211,7 +2644,7 @@
       </p:sp>
       <p:sp>
         <p:nvSpPr>
-          <p:cNvPr id="8" name="PlaceHolder 2"/>
+          <p:cNvPr id="5" name="PlaceHolder 2"/>
           <p:cNvSpPr>
             <a:spLocks noGrp="1"/>
           </p:cNvSpPr>
@@ -1222,7 +2655,7 @@
         <p:spPr>
           <a:xfrm>
             <a:off x="504000" y="1769040"/>
-            <a:ext cx="9071640" cy="4384440"/>
+            <a:ext cx="9071280" cy="4384080"/>
           </a:xfrm>
           <a:prstGeom prst="rect">
             <a:avLst/>
@@ -1269,7 +2702,7 @@
       </p:grpSpPr>
       <p:sp>
         <p:nvSpPr>
-          <p:cNvPr id="9" name="PlaceHolder 1"/>
+          <p:cNvPr id="6" name="PlaceHolder 1"/>
           <p:cNvSpPr>
             <a:spLocks noGrp="1"/>
           </p:cNvSpPr>
@@ -1280,7 +2713,7 @@
         <p:spPr>
           <a:xfrm>
             <a:off x="504000" y="301320"/>
-            <a:ext cx="9071640" cy="1262160"/>
+            <a:ext cx="9071280" cy="1261800"/>
           </a:xfrm>
           <a:prstGeom prst="rect">
             <a:avLst/>
@@ -1306,7 +2739,7 @@
       </p:sp>
       <p:sp>
         <p:nvSpPr>
-          <p:cNvPr id="10" name="PlaceHolder 2"/>
+          <p:cNvPr id="7" name="PlaceHolder 2"/>
           <p:cNvSpPr>
             <a:spLocks noGrp="1"/>
           </p:cNvSpPr>
@@ -1317,7 +2750,7 @@
         <p:spPr>
           <a:xfrm>
             <a:off x="504000" y="1769040"/>
-            <a:ext cx="4426920" cy="4384440"/>
+            <a:ext cx="4426560" cy="4384080"/>
           </a:xfrm>
           <a:prstGeom prst="rect">
             <a:avLst/>
@@ -1342,7 +2775,7 @@
       </p:sp>
       <p:sp>
         <p:nvSpPr>
-          <p:cNvPr id="11" name="PlaceHolder 3"/>
+          <p:cNvPr id="8" name="PlaceHolder 3"/>
           <p:cNvSpPr>
             <a:spLocks noGrp="1"/>
           </p:cNvSpPr>
@@ -1352,8 +2785,8 @@
         </p:nvSpPr>
         <p:spPr>
           <a:xfrm>
-            <a:off x="5152680" y="1769040"/>
-            <a:ext cx="4426920" cy="4384440"/>
+            <a:off x="5152320" y="1769040"/>
+            <a:ext cx="4426560" cy="4384080"/>
           </a:xfrm>
           <a:prstGeom prst="rect">
             <a:avLst/>
@@ -1400,7 +2833,7 @@
       </p:grpSpPr>
       <p:sp>
         <p:nvSpPr>
-          <p:cNvPr id="12" name="PlaceHolder 1"/>
+          <p:cNvPr id="9" name="PlaceHolder 1"/>
           <p:cNvSpPr>
             <a:spLocks noGrp="1"/>
           </p:cNvSpPr>
@@ -1411,7 +2844,7 @@
         <p:spPr>
           <a:xfrm>
             <a:off x="504000" y="301320"/>
-            <a:ext cx="9071640" cy="1262160"/>
+            <a:ext cx="9071280" cy="1261800"/>
           </a:xfrm>
           <a:prstGeom prst="rect">
             <a:avLst/>
@@ -1459,7 +2892,7 @@
       </p:grpSpPr>
       <p:sp>
         <p:nvSpPr>
-          <p:cNvPr id="13" name="PlaceHolder 1"/>
+          <p:cNvPr id="10" name="PlaceHolder 1"/>
           <p:cNvSpPr>
             <a:spLocks noGrp="1"/>
           </p:cNvSpPr>
@@ -1470,7 +2903,7 @@
         <p:spPr>
           <a:xfrm>
             <a:off x="504000" y="301320"/>
-            <a:ext cx="9071640" cy="5851800"/>
+            <a:ext cx="9071280" cy="5850360"/>
           </a:xfrm>
           <a:prstGeom prst="rect">
             <a:avLst/>
@@ -1518,7 +2951,7 @@
       </p:grpSpPr>
       <p:sp>
         <p:nvSpPr>
-          <p:cNvPr id="14" name="PlaceHolder 1"/>
+          <p:cNvPr id="11" name="PlaceHolder 1"/>
           <p:cNvSpPr>
             <a:spLocks noGrp="1"/>
           </p:cNvSpPr>
@@ -1529,7 +2962,7 @@
         <p:spPr>
           <a:xfrm>
             <a:off x="504000" y="301320"/>
-            <a:ext cx="9071640" cy="1262160"/>
+            <a:ext cx="9071280" cy="1261800"/>
           </a:xfrm>
           <a:prstGeom prst="rect">
             <a:avLst/>
@@ -1555,7 +2988,7 @@
       </p:sp>
       <p:sp>
         <p:nvSpPr>
-          <p:cNvPr id="15" name="PlaceHolder 2"/>
+          <p:cNvPr id="12" name="PlaceHolder 2"/>
           <p:cNvSpPr>
             <a:spLocks noGrp="1"/>
           </p:cNvSpPr>
@@ -1566,7 +2999,7 @@
         <p:spPr>
           <a:xfrm>
             <a:off x="504000" y="1769040"/>
-            <a:ext cx="4426920" cy="2091240"/>
+            <a:ext cx="4426560" cy="2090880"/>
           </a:xfrm>
           <a:prstGeom prst="rect">
             <a:avLst/>
@@ -1591,7 +3024,7 @@
       </p:sp>
       <p:sp>
         <p:nvSpPr>
-          <p:cNvPr id="16" name="PlaceHolder 3"/>
+          <p:cNvPr id="13" name="PlaceHolder 3"/>
           <p:cNvSpPr>
             <a:spLocks noGrp="1"/>
           </p:cNvSpPr>
@@ -1601,8 +3034,8 @@
         </p:nvSpPr>
         <p:spPr>
           <a:xfrm>
-            <a:off x="504000" y="4059360"/>
-            <a:ext cx="4426920" cy="2091240"/>
+            <a:off x="504000" y="4059000"/>
+            <a:ext cx="4426560" cy="2090880"/>
           </a:xfrm>
           <a:prstGeom prst="rect">
             <a:avLst/>
@@ -1627,7 +3060,7 @@
       </p:sp>
       <p:sp>
         <p:nvSpPr>
-          <p:cNvPr id="17" name="PlaceHolder 4"/>
+          <p:cNvPr id="14" name="PlaceHolder 4"/>
           <p:cNvSpPr>
             <a:spLocks noGrp="1"/>
           </p:cNvSpPr>
@@ -1637,8 +3070,8 @@
         </p:nvSpPr>
         <p:spPr>
           <a:xfrm>
-            <a:off x="5152680" y="1769040"/>
-            <a:ext cx="4426920" cy="4384440"/>
+            <a:off x="5152320" y="1769040"/>
+            <a:ext cx="4426560" cy="4384080"/>
           </a:xfrm>
           <a:prstGeom prst="rect">
             <a:avLst/>
@@ -1685,7 +3118,7 @@
       </p:grpSpPr>
       <p:sp>
         <p:nvSpPr>
-          <p:cNvPr id="18" name="PlaceHolder 1"/>
+          <p:cNvPr id="15" name="PlaceHolder 1"/>
           <p:cNvSpPr>
             <a:spLocks noGrp="1"/>
           </p:cNvSpPr>
@@ -1696,7 +3129,7 @@
         <p:spPr>
           <a:xfrm>
             <a:off x="504000" y="301320"/>
-            <a:ext cx="9071640" cy="1262160"/>
+            <a:ext cx="9071280" cy="1261800"/>
           </a:xfrm>
           <a:prstGeom prst="rect">
             <a:avLst/>
@@ -1722,7 +3155,7 @@
       </p:sp>
       <p:sp>
         <p:nvSpPr>
-          <p:cNvPr id="19" name="PlaceHolder 2"/>
+          <p:cNvPr id="16" name="PlaceHolder 2"/>
           <p:cNvSpPr>
             <a:spLocks noGrp="1"/>
           </p:cNvSpPr>
@@ -1733,7 +3166,7 @@
         <p:spPr>
           <a:xfrm>
             <a:off x="504000" y="1769040"/>
-            <a:ext cx="4426920" cy="4384440"/>
+            <a:ext cx="4426560" cy="4384080"/>
           </a:xfrm>
           <a:prstGeom prst="rect">
             <a:avLst/>
@@ -1758,7 +3191,7 @@
       </p:sp>
       <p:sp>
         <p:nvSpPr>
-          <p:cNvPr id="20" name="PlaceHolder 3"/>
+          <p:cNvPr id="17" name="PlaceHolder 3"/>
           <p:cNvSpPr>
             <a:spLocks noGrp="1"/>
           </p:cNvSpPr>
@@ -1768,8 +3201,8 @@
         </p:nvSpPr>
         <p:spPr>
           <a:xfrm>
-            <a:off x="5152680" y="1769040"/>
-            <a:ext cx="4426920" cy="2091240"/>
+            <a:off x="5152320" y="1769040"/>
+            <a:ext cx="4426560" cy="2090880"/>
           </a:xfrm>
           <a:prstGeom prst="rect">
             <a:avLst/>
@@ -1794,7 +3227,7 @@
       </p:sp>
       <p:sp>
         <p:nvSpPr>
-          <p:cNvPr id="21" name="PlaceHolder 4"/>
+          <p:cNvPr id="18" name="PlaceHolder 4"/>
           <p:cNvSpPr>
             <a:spLocks noGrp="1"/>
           </p:cNvSpPr>
@@ -1804,8 +3237,8 @@
         </p:nvSpPr>
         <p:spPr>
           <a:xfrm>
-            <a:off x="5152680" y="4059360"/>
-            <a:ext cx="4426920" cy="2091240"/>
+            <a:off x="5152320" y="4059000"/>
+            <a:ext cx="4426560" cy="2090880"/>
           </a:xfrm>
           <a:prstGeom prst="rect">
             <a:avLst/>
@@ -1852,7 +3285,7 @@
       </p:grpSpPr>
       <p:sp>
         <p:nvSpPr>
-          <p:cNvPr id="22" name="PlaceHolder 1"/>
+          <p:cNvPr id="19" name="PlaceHolder 1"/>
           <p:cNvSpPr>
             <a:spLocks noGrp="1"/>
           </p:cNvSpPr>
@@ -1863,7 +3296,7 @@
         <p:spPr>
           <a:xfrm>
             <a:off x="504000" y="301320"/>
-            <a:ext cx="9071640" cy="1262160"/>
+            <a:ext cx="9071280" cy="1261800"/>
           </a:xfrm>
           <a:prstGeom prst="rect">
             <a:avLst/>
@@ -1889,7 +3322,7 @@
       </p:sp>
       <p:sp>
         <p:nvSpPr>
-          <p:cNvPr id="23" name="PlaceHolder 2"/>
+          <p:cNvPr id="20" name="PlaceHolder 2"/>
           <p:cNvSpPr>
             <a:spLocks noGrp="1"/>
           </p:cNvSpPr>
@@ -1900,7 +3333,7 @@
         <p:spPr>
           <a:xfrm>
             <a:off x="504000" y="1769040"/>
-            <a:ext cx="4426920" cy="2091240"/>
+            <a:ext cx="4426560" cy="2090880"/>
           </a:xfrm>
           <a:prstGeom prst="rect">
             <a:avLst/>
@@ -1925,7 +3358,7 @@
       </p:sp>
       <p:sp>
         <p:nvSpPr>
-          <p:cNvPr id="24" name="PlaceHolder 3"/>
+          <p:cNvPr id="21" name="PlaceHolder 3"/>
           <p:cNvSpPr>
             <a:spLocks noGrp="1"/>
           </p:cNvSpPr>
@@ -1935,8 +3368,8 @@
         </p:nvSpPr>
         <p:spPr>
           <a:xfrm>
-            <a:off x="5152680" y="1769040"/>
-            <a:ext cx="4426920" cy="2091240"/>
+            <a:off x="5152320" y="1769040"/>
+            <a:ext cx="4426560" cy="2090880"/>
           </a:xfrm>
           <a:prstGeom prst="rect">
             <a:avLst/>
@@ -1961,7 +3394,7 @@
       </p:sp>
       <p:sp>
         <p:nvSpPr>
-          <p:cNvPr id="25" name="PlaceHolder 4"/>
+          <p:cNvPr id="22" name="PlaceHolder 4"/>
           <p:cNvSpPr>
             <a:spLocks noGrp="1"/>
           </p:cNvSpPr>
@@ -1971,8 +3404,8 @@
         </p:nvSpPr>
         <p:spPr>
           <a:xfrm>
-            <a:off x="504000" y="4059360"/>
-            <a:ext cx="9071640" cy="2091240"/>
+            <a:off x="504000" y="4059000"/>
+            <a:ext cx="9071280" cy="2090880"/>
           </a:xfrm>
           <a:prstGeom prst="rect">
             <a:avLst/>
@@ -2030,7 +3463,7 @@
         <p:spPr>
           <a:xfrm>
             <a:off x="504000" y="301320"/>
-            <a:ext cx="9071640" cy="1262160"/>
+            <a:ext cx="9071280" cy="1261800"/>
           </a:xfrm>
           <a:prstGeom prst="rect">
             <a:avLst/>
@@ -2040,20 +3473,6 @@
           <a:bodyPr lIns="0" rIns="0" tIns="0" bIns="0" anchor="ctr"/>
           <a:p>
             <a:pPr algn="ctr"/>
-            <a:r>
-              <a:rPr b="0" lang="en-US" sz="4400" spc="-1" strike="noStrike">
-                <a:solidFill>
-                  <a:srgbClr val="000000"/>
-                </a:solidFill>
-                <a:uFill>
-                  <a:solidFill>
-                    <a:srgbClr val="ffffff"/>
-                  </a:solidFill>
-                </a:uFill>
-                <a:latin typeface="Arial"/>
-              </a:rPr>
-              <a:t>Click to edit the title text format</a:t>
-            </a:r>
             <a:endParaRPr b="0" lang="en-US" sz="4400" spc="-1" strike="noStrike">
               <a:solidFill>
                 <a:srgbClr val="000000"/>
@@ -2080,8 +3499,8 @@
         </p:nvSpPr>
         <p:spPr>
           <a:xfrm>
-            <a:off x="504000" y="1769040"/>
-            <a:ext cx="9071640" cy="4384440"/>
+            <a:off x="504000" y="1768680"/>
+            <a:ext cx="9072000" cy="4384080"/>
           </a:xfrm>
           <a:prstGeom prst="rect">
             <a:avLst/>
@@ -2332,158 +3751,6 @@
                 </a:solidFill>
               </a:uFill>
               <a:latin typeface="Arial"/>
-            </a:endParaRPr>
-          </a:p>
-        </p:txBody>
-      </p:sp>
-      <p:sp>
-        <p:nvSpPr>
-          <p:cNvPr id="2" name="PlaceHolder 3"/>
-          <p:cNvSpPr>
-            <a:spLocks noGrp="1"/>
-          </p:cNvSpPr>
-          <p:nvPr>
-            <p:ph type="dt"/>
-          </p:nvPr>
-        </p:nvSpPr>
-        <p:spPr>
-          <a:xfrm>
-            <a:off x="504000" y="6887160"/>
-            <a:ext cx="2348280" cy="521280"/>
-          </a:xfrm>
-          <a:prstGeom prst="rect">
-            <a:avLst/>
-          </a:prstGeom>
-        </p:spPr>
-        <p:txBody>
-          <a:bodyPr lIns="0" rIns="0" tIns="0" bIns="0"/>
-          <a:p>
-            <a:r>
-              <a:rPr b="0" lang="en-US" sz="1400" spc="-1" strike="noStrike">
-                <a:solidFill>
-                  <a:srgbClr val="000000"/>
-                </a:solidFill>
-                <a:uFill>
-                  <a:solidFill>
-                    <a:srgbClr val="ffffff"/>
-                  </a:solidFill>
-                </a:uFill>
-                <a:latin typeface="Times New Roman"/>
-              </a:rPr>
-              <a:t> </a:t>
-            </a:r>
-            <a:endParaRPr b="0" lang="en-US" sz="1400" spc="-1" strike="noStrike">
-              <a:solidFill>
-                <a:srgbClr val="000000"/>
-              </a:solidFill>
-              <a:uFill>
-                <a:solidFill>
-                  <a:srgbClr val="ffffff"/>
-                </a:solidFill>
-              </a:uFill>
-              <a:latin typeface="Times New Roman"/>
-            </a:endParaRPr>
-          </a:p>
-        </p:txBody>
-      </p:sp>
-      <p:sp>
-        <p:nvSpPr>
-          <p:cNvPr id="3" name="PlaceHolder 4"/>
-          <p:cNvSpPr>
-            <a:spLocks noGrp="1"/>
-          </p:cNvSpPr>
-          <p:nvPr>
-            <p:ph type="ftr"/>
-          </p:nvPr>
-        </p:nvSpPr>
-        <p:spPr>
-          <a:xfrm>
-            <a:off x="3447360" y="6887160"/>
-            <a:ext cx="3195000" cy="521280"/>
-          </a:xfrm>
-          <a:prstGeom prst="rect">
-            <a:avLst/>
-          </a:prstGeom>
-        </p:spPr>
-        <p:txBody>
-          <a:bodyPr lIns="0" rIns="0" tIns="0" bIns="0"/>
-          <a:p>
-            <a:pPr algn="ctr"/>
-            <a:r>
-              <a:rPr b="0" lang="en-US" sz="1400" spc="-1" strike="noStrike">
-                <a:solidFill>
-                  <a:srgbClr val="000000"/>
-                </a:solidFill>
-                <a:uFill>
-                  <a:solidFill>
-                    <a:srgbClr val="ffffff"/>
-                  </a:solidFill>
-                </a:uFill>
-                <a:latin typeface="Times New Roman"/>
-              </a:rPr>
-              <a:t> </a:t>
-            </a:r>
-            <a:endParaRPr b="0" lang="en-US" sz="1400" spc="-1" strike="noStrike">
-              <a:solidFill>
-                <a:srgbClr val="000000"/>
-              </a:solidFill>
-              <a:uFill>
-                <a:solidFill>
-                  <a:srgbClr val="ffffff"/>
-                </a:solidFill>
-              </a:uFill>
-              <a:latin typeface="Times New Roman"/>
-            </a:endParaRPr>
-          </a:p>
-        </p:txBody>
-      </p:sp>
-      <p:sp>
-        <p:nvSpPr>
-          <p:cNvPr id="4" name="PlaceHolder 5"/>
-          <p:cNvSpPr>
-            <a:spLocks noGrp="1"/>
-          </p:cNvSpPr>
-          <p:nvPr>
-            <p:ph type="sldNum"/>
-          </p:nvPr>
-        </p:nvSpPr>
-        <p:spPr>
-          <a:xfrm>
-            <a:off x="7227360" y="6887160"/>
-            <a:ext cx="2348280" cy="521280"/>
-          </a:xfrm>
-          <a:prstGeom prst="rect">
-            <a:avLst/>
-          </a:prstGeom>
-        </p:spPr>
-        <p:txBody>
-          <a:bodyPr lIns="0" rIns="0" tIns="0" bIns="0"/>
-          <a:p>
-            <a:pPr algn="r"/>
-            <a:fld id="{3DB6DC75-A808-478F-AA94-25EACC788EC3}" type="slidenum">
-              <a:rPr b="0" lang="en-US" sz="1400" spc="-1" strike="noStrike">
-                <a:solidFill>
-                  <a:srgbClr val="000000"/>
-                </a:solidFill>
-                <a:uFill>
-                  <a:solidFill>
-                    <a:srgbClr val="ffffff"/>
-                  </a:solidFill>
-                </a:uFill>
-                <a:latin typeface="Times New Roman"/>
-              </a:rPr>
-              <a:t>1</a:t>
-            </a:fld>
-            <a:endParaRPr b="0" lang="en-US" sz="1400" spc="-1" strike="noStrike">
-              <a:solidFill>
-                <a:srgbClr val="000000"/>
-              </a:solidFill>
-              <a:uFill>
-                <a:solidFill>
-                  <a:srgbClr val="ffffff"/>
-                </a:solidFill>
-              </a:uFill>
-              <a:latin typeface="Times New Roman"/>
             </a:endParaRPr>
           </a:p>
         </p:txBody>
@@ -2504,6 +3771,348 @@
     <p:sldLayoutId id="2147483658" r:id="rId11"/>
     <p:sldLayoutId id="2147483659" r:id="rId12"/>
     <p:sldLayoutId id="2147483660" r:id="rId13"/>
+  </p:sldLayoutIdLst>
+</p:sldMaster>
+</file>
+
+<file path=ppt/slideMasters/slideMaster2.xml><?xml version="1.0" encoding="utf-8"?>
+<p:sldMaster xmlns:a="http://schemas.openxmlformats.org/drawingml/2006/main" xmlns:p="http://schemas.openxmlformats.org/presentationml/2006/main" xmlns:r="http://schemas.openxmlformats.org/officeDocument/2006/relationships" xmlns:p14="http://schemas.microsoft.com/office/powerpoint/2010/main" xmlns:p15="http://schemas.microsoft.com/office/powerpoint/2012/main" xmlns:mc="http://schemas.openxmlformats.org/markup-compatibility/2006">
+  <p:cSld>
+    <p:spTree>
+      <p:nvGrpSpPr>
+        <p:cNvPr id="1" name=""/>
+        <p:cNvGrpSpPr/>
+        <p:nvPr/>
+      </p:nvGrpSpPr>
+      <p:grpSpPr>
+        <a:xfrm>
+          <a:off x="0" y="0"/>
+          <a:ext cx="0" cy="0"/>
+          <a:chOff x="0" y="0"/>
+          <a:chExt cx="0" cy="0"/>
+        </a:xfrm>
+      </p:grpSpPr>
+      <p:sp>
+        <p:nvSpPr>
+          <p:cNvPr id="36" name="PlaceHolder 1"/>
+          <p:cNvSpPr>
+            <a:spLocks noGrp="1"/>
+          </p:cNvSpPr>
+          <p:nvPr>
+            <p:ph type="title"/>
+          </p:nvPr>
+        </p:nvSpPr>
+        <p:spPr>
+          <a:xfrm>
+            <a:off x="504000" y="301320"/>
+            <a:ext cx="9071280" cy="1261800"/>
+          </a:xfrm>
+          <a:prstGeom prst="rect">
+            <a:avLst/>
+          </a:prstGeom>
+        </p:spPr>
+        <p:txBody>
+          <a:bodyPr lIns="0" rIns="0" tIns="0" bIns="0" anchor="ctr"/>
+          <a:p>
+            <a:pPr algn="ctr"/>
+            <a:endParaRPr b="0" lang="en-US" sz="4400" spc="-1" strike="noStrike">
+              <a:solidFill>
+                <a:srgbClr val="000000"/>
+              </a:solidFill>
+              <a:uFill>
+                <a:solidFill>
+                  <a:srgbClr val="ffffff"/>
+                </a:solidFill>
+              </a:uFill>
+              <a:latin typeface="Arial"/>
+            </a:endParaRPr>
+          </a:p>
+        </p:txBody>
+      </p:sp>
+      <p:sp>
+        <p:nvSpPr>
+          <p:cNvPr id="37" name="PlaceHolder 2"/>
+          <p:cNvSpPr>
+            <a:spLocks noGrp="1"/>
+          </p:cNvSpPr>
+          <p:nvPr>
+            <p:ph type="body"/>
+          </p:nvPr>
+        </p:nvSpPr>
+        <p:spPr>
+          <a:xfrm>
+            <a:off x="504000" y="1769040"/>
+            <a:ext cx="9071280" cy="4384080"/>
+          </a:xfrm>
+          <a:prstGeom prst="rect">
+            <a:avLst/>
+          </a:prstGeom>
+        </p:spPr>
+        <p:txBody>
+          <a:bodyPr lIns="0" rIns="0" tIns="0" bIns="0"/>
+          <a:p>
+            <a:pPr marL="432000" indent="-324000">
+              <a:buClr>
+                <a:srgbClr val="000000"/>
+              </a:buClr>
+              <a:buSzPct val="45000"/>
+              <a:buFont typeface="Wingdings" charset="2"/>
+              <a:buChar char=""/>
+            </a:pPr>
+            <a:r>
+              <a:rPr b="0" lang="en-US" sz="1800" spc="-1" strike="noStrike">
+                <a:solidFill>
+                  <a:srgbClr val="000000"/>
+                </a:solidFill>
+                <a:uFill>
+                  <a:solidFill>
+                    <a:srgbClr val="ffffff"/>
+                  </a:solidFill>
+                </a:uFill>
+                <a:latin typeface="Arial"/>
+              </a:rPr>
+              <a:t>Click to edit the outline text format</a:t>
+            </a:r>
+            <a:endParaRPr b="0" lang="en-US" sz="1800" spc="-1" strike="noStrike">
+              <a:solidFill>
+                <a:srgbClr val="000000"/>
+              </a:solidFill>
+              <a:uFill>
+                <a:solidFill>
+                  <a:srgbClr val="ffffff"/>
+                </a:solidFill>
+              </a:uFill>
+              <a:latin typeface="Arial"/>
+            </a:endParaRPr>
+          </a:p>
+          <a:p>
+            <a:pPr lvl="1" marL="864000" indent="-324000">
+              <a:buClr>
+                <a:srgbClr val="000000"/>
+              </a:buClr>
+              <a:buSzPct val="75000"/>
+              <a:buFont typeface="Symbol" charset="2"/>
+              <a:buChar char=""/>
+            </a:pPr>
+            <a:r>
+              <a:rPr b="0" lang="en-US" sz="1800" spc="-1" strike="noStrike">
+                <a:solidFill>
+                  <a:srgbClr val="000000"/>
+                </a:solidFill>
+                <a:uFill>
+                  <a:solidFill>
+                    <a:srgbClr val="ffffff"/>
+                  </a:solidFill>
+                </a:uFill>
+                <a:latin typeface="Arial"/>
+              </a:rPr>
+              <a:t>Second Outline Level</a:t>
+            </a:r>
+            <a:endParaRPr b="0" lang="en-US" sz="1800" spc="-1" strike="noStrike">
+              <a:solidFill>
+                <a:srgbClr val="000000"/>
+              </a:solidFill>
+              <a:uFill>
+                <a:solidFill>
+                  <a:srgbClr val="ffffff"/>
+                </a:solidFill>
+              </a:uFill>
+              <a:latin typeface="Arial"/>
+            </a:endParaRPr>
+          </a:p>
+          <a:p>
+            <a:pPr lvl="2" marL="1296000" indent="-288000">
+              <a:buClr>
+                <a:srgbClr val="000000"/>
+              </a:buClr>
+              <a:buSzPct val="45000"/>
+              <a:buFont typeface="Wingdings" charset="2"/>
+              <a:buChar char=""/>
+            </a:pPr>
+            <a:r>
+              <a:rPr b="0" lang="en-US" sz="1800" spc="-1" strike="noStrike">
+                <a:solidFill>
+                  <a:srgbClr val="000000"/>
+                </a:solidFill>
+                <a:uFill>
+                  <a:solidFill>
+                    <a:srgbClr val="ffffff"/>
+                  </a:solidFill>
+                </a:uFill>
+                <a:latin typeface="Arial"/>
+              </a:rPr>
+              <a:t>Third Outline Level</a:t>
+            </a:r>
+            <a:endParaRPr b="0" lang="en-US" sz="1800" spc="-1" strike="noStrike">
+              <a:solidFill>
+                <a:srgbClr val="000000"/>
+              </a:solidFill>
+              <a:uFill>
+                <a:solidFill>
+                  <a:srgbClr val="ffffff"/>
+                </a:solidFill>
+              </a:uFill>
+              <a:latin typeface="Arial"/>
+            </a:endParaRPr>
+          </a:p>
+          <a:p>
+            <a:pPr lvl="3" marL="1728000" indent="-216000">
+              <a:buClr>
+                <a:srgbClr val="000000"/>
+              </a:buClr>
+              <a:buSzPct val="75000"/>
+              <a:buFont typeface="Symbol" charset="2"/>
+              <a:buChar char=""/>
+            </a:pPr>
+            <a:r>
+              <a:rPr b="0" lang="en-US" sz="1800" spc="-1" strike="noStrike">
+                <a:solidFill>
+                  <a:srgbClr val="000000"/>
+                </a:solidFill>
+                <a:uFill>
+                  <a:solidFill>
+                    <a:srgbClr val="ffffff"/>
+                  </a:solidFill>
+                </a:uFill>
+                <a:latin typeface="Arial"/>
+              </a:rPr>
+              <a:t>Fourth Outline Level</a:t>
+            </a:r>
+            <a:endParaRPr b="0" lang="en-US" sz="1800" spc="-1" strike="noStrike">
+              <a:solidFill>
+                <a:srgbClr val="000000"/>
+              </a:solidFill>
+              <a:uFill>
+                <a:solidFill>
+                  <a:srgbClr val="ffffff"/>
+                </a:solidFill>
+              </a:uFill>
+              <a:latin typeface="Arial"/>
+            </a:endParaRPr>
+          </a:p>
+          <a:p>
+            <a:pPr lvl="4" marL="2160000" indent="-216000">
+              <a:buClr>
+                <a:srgbClr val="000000"/>
+              </a:buClr>
+              <a:buSzPct val="45000"/>
+              <a:buFont typeface="Wingdings" charset="2"/>
+              <a:buChar char=""/>
+            </a:pPr>
+            <a:r>
+              <a:rPr b="0" lang="en-US" sz="1800" spc="-1" strike="noStrike">
+                <a:solidFill>
+                  <a:srgbClr val="000000"/>
+                </a:solidFill>
+                <a:uFill>
+                  <a:solidFill>
+                    <a:srgbClr val="ffffff"/>
+                  </a:solidFill>
+                </a:uFill>
+                <a:latin typeface="Arial"/>
+              </a:rPr>
+              <a:t>Fifth Outline Level</a:t>
+            </a:r>
+            <a:endParaRPr b="0" lang="en-US" sz="1800" spc="-1" strike="noStrike">
+              <a:solidFill>
+                <a:srgbClr val="000000"/>
+              </a:solidFill>
+              <a:uFill>
+                <a:solidFill>
+                  <a:srgbClr val="ffffff"/>
+                </a:solidFill>
+              </a:uFill>
+              <a:latin typeface="Arial"/>
+            </a:endParaRPr>
+          </a:p>
+          <a:p>
+            <a:pPr lvl="5" marL="2592000" indent="-216000">
+              <a:buClr>
+                <a:srgbClr val="000000"/>
+              </a:buClr>
+              <a:buSzPct val="45000"/>
+              <a:buFont typeface="Wingdings" charset="2"/>
+              <a:buChar char=""/>
+            </a:pPr>
+            <a:r>
+              <a:rPr b="0" lang="en-US" sz="1800" spc="-1" strike="noStrike">
+                <a:solidFill>
+                  <a:srgbClr val="000000"/>
+                </a:solidFill>
+                <a:uFill>
+                  <a:solidFill>
+                    <a:srgbClr val="ffffff"/>
+                  </a:solidFill>
+                </a:uFill>
+                <a:latin typeface="Arial"/>
+              </a:rPr>
+              <a:t>Sixth Outline Level</a:t>
+            </a:r>
+            <a:endParaRPr b="0" lang="en-US" sz="1800" spc="-1" strike="noStrike">
+              <a:solidFill>
+                <a:srgbClr val="000000"/>
+              </a:solidFill>
+              <a:uFill>
+                <a:solidFill>
+                  <a:srgbClr val="ffffff"/>
+                </a:solidFill>
+              </a:uFill>
+              <a:latin typeface="Arial"/>
+            </a:endParaRPr>
+          </a:p>
+          <a:p>
+            <a:pPr lvl="6" marL="3024000" indent="-216000">
+              <a:buClr>
+                <a:srgbClr val="000000"/>
+              </a:buClr>
+              <a:buSzPct val="45000"/>
+              <a:buFont typeface="Wingdings" charset="2"/>
+              <a:buChar char=""/>
+            </a:pPr>
+            <a:r>
+              <a:rPr b="0" lang="en-US" sz="1800" spc="-1" strike="noStrike">
+                <a:solidFill>
+                  <a:srgbClr val="000000"/>
+                </a:solidFill>
+                <a:uFill>
+                  <a:solidFill>
+                    <a:srgbClr val="ffffff"/>
+                  </a:solidFill>
+                </a:uFill>
+                <a:latin typeface="Arial"/>
+              </a:rPr>
+              <a:t>Seventh Outline Level</a:t>
+            </a:r>
+            <a:endParaRPr b="0" lang="en-US" sz="1800" spc="-1" strike="noStrike">
+              <a:solidFill>
+                <a:srgbClr val="000000"/>
+              </a:solidFill>
+              <a:uFill>
+                <a:solidFill>
+                  <a:srgbClr val="ffffff"/>
+                </a:solidFill>
+              </a:uFill>
+              <a:latin typeface="Arial"/>
+            </a:endParaRPr>
+          </a:p>
+        </p:txBody>
+      </p:sp>
+    </p:spTree>
+  </p:cSld>
+  <p:clrMap bg1="lt1" bg2="lt2" tx1="dk1" tx2="dk2" accent1="accent1" accent2="accent2" accent3="accent3" accent4="accent4" accent5="accent5" accent6="accent6" hlink="hlink" folHlink="folHlink"/>
+  <p:sldLayoutIdLst>
+    <p:sldLayoutId id="2147483662" r:id="rId2"/>
+    <p:sldLayoutId id="2147483663" r:id="rId3"/>
+    <p:sldLayoutId id="2147483664" r:id="rId4"/>
+    <p:sldLayoutId id="2147483665" r:id="rId5"/>
+    <p:sldLayoutId id="2147483666" r:id="rId6"/>
+    <p:sldLayoutId id="2147483667" r:id="rId7"/>
+    <p:sldLayoutId id="2147483668" r:id="rId8"/>
+    <p:sldLayoutId id="2147483669" r:id="rId9"/>
+    <p:sldLayoutId id="2147483670" r:id="rId10"/>
+    <p:sldLayoutId id="2147483671" r:id="rId11"/>
+    <p:sldLayoutId id="2147483672" r:id="rId12"/>
+    <p:sldLayoutId id="2147483673" r:id="rId13"/>
   </p:sldLayoutIdLst>
 </p:sldMaster>
 </file>
@@ -2527,14 +4136,14 @@
       </p:grpSpPr>
       <p:sp>
         <p:nvSpPr>
-          <p:cNvPr id="44" name="TextShape 1"/>
-          <p:cNvSpPr txBox="1"/>
+          <p:cNvPr id="77" name="CustomShape 1"/>
+          <p:cNvSpPr/>
           <p:nvPr/>
         </p:nvSpPr>
         <p:spPr>
           <a:xfrm>
             <a:off x="504000" y="301320"/>
-            <a:ext cx="9071640" cy="1262160"/>
+            <a:ext cx="9071280" cy="1261800"/>
           </a:xfrm>
           <a:prstGeom prst="rect">
             <a:avLst/>
@@ -2544,10 +4153,20 @@
             <a:noFill/>
           </a:ln>
         </p:spPr>
+        <p:style>
+          <a:lnRef idx="0"/>
+          <a:fillRef idx="0"/>
+          <a:effectRef idx="0"/>
+          <a:fontRef idx="minor"/>
+        </p:style>
         <p:txBody>
           <a:bodyPr lIns="0" rIns="0" tIns="0" bIns="0" anchor="ctr"/>
           <a:p>
-            <a:pPr algn="ctr"/>
+            <a:pPr algn="ctr">
+              <a:lnSpc>
+                <a:spcPct val="100000"/>
+              </a:lnSpc>
+            </a:pPr>
             <a:r>
               <a:rPr b="0" lang="en-US" sz="4400" spc="-1" strike="noStrike">
                 <a:solidFill>
@@ -2562,30 +4181,30 @@
               </a:rPr>
               <a:t>Privacy Enhancing Technologies and Limitations</a:t>
             </a:r>
-            <a:endParaRPr b="0" lang="en-US" sz="4400" spc="-1" strike="noStrike">
-              <a:solidFill>
-                <a:srgbClr val="000000"/>
-              </a:solidFill>
-              <a:uFill>
-                <a:solidFill>
-                  <a:srgbClr val="ffffff"/>
-                </a:solidFill>
-              </a:uFill>
-              <a:latin typeface="Arial"/>
-            </a:endParaRPr>
-          </a:p>
-        </p:txBody>
-      </p:sp>
-      <p:sp>
-        <p:nvSpPr>
-          <p:cNvPr id="45" name="TextShape 2"/>
-          <p:cNvSpPr txBox="1"/>
+            <a:endParaRPr b="0" lang="en-US" sz="1800" spc="-1" strike="noStrike">
+              <a:solidFill>
+                <a:srgbClr val="000000"/>
+              </a:solidFill>
+              <a:uFill>
+                <a:solidFill>
+                  <a:srgbClr val="ffffff"/>
+                </a:solidFill>
+              </a:uFill>
+              <a:latin typeface="Arial"/>
+            </a:endParaRPr>
+          </a:p>
+        </p:txBody>
+      </p:sp>
+      <p:sp>
+        <p:nvSpPr>
+          <p:cNvPr id="78" name="CustomShape 2"/>
+          <p:cNvSpPr/>
           <p:nvPr/>
         </p:nvSpPr>
         <p:spPr>
           <a:xfrm>
             <a:off x="731520" y="1828800"/>
-            <a:ext cx="9052560" cy="715320"/>
+            <a:ext cx="9052200" cy="714960"/>
           </a:xfrm>
           <a:prstGeom prst="rect">
             <a:avLst/>
@@ -2595,10 +4214,20 @@
             <a:noFill/>
           </a:ln>
         </p:spPr>
+        <p:style>
+          <a:lnRef idx="0"/>
+          <a:fillRef idx="0"/>
+          <a:effectRef idx="0"/>
+          <a:fontRef idx="minor"/>
+        </p:style>
         <p:txBody>
           <a:bodyPr lIns="90000" rIns="90000" tIns="45000" bIns="45000"/>
           <a:p>
-            <a:pPr algn="ctr"/>
+            <a:pPr algn="ctr">
+              <a:lnSpc>
+                <a:spcPct val="100000"/>
+              </a:lnSpc>
+            </a:pPr>
             <a:r>
               <a:rPr b="0" lang="en-US" sz="2200" spc="-1" strike="noStrike">
                 <a:solidFill>
@@ -2626,7 +4255,11 @@
             </a:endParaRPr>
           </a:p>
           <a:p>
-            <a:pPr algn="ctr"/>
+            <a:pPr algn="ctr">
+              <a:lnSpc>
+                <a:spcPct val="100000"/>
+              </a:lnSpc>
+            </a:pPr>
             <a:r>
               <a:rPr b="0" lang="en-US" sz="2200" spc="-1" strike="noStrike">
                 <a:solidFill>
@@ -2706,14 +4339,14 @@
       </p:grpSpPr>
       <p:sp>
         <p:nvSpPr>
-          <p:cNvPr id="46" name="TextShape 1"/>
-          <p:cNvSpPr txBox="1"/>
+          <p:cNvPr id="79" name="CustomShape 1"/>
+          <p:cNvSpPr/>
           <p:nvPr/>
         </p:nvSpPr>
         <p:spPr>
           <a:xfrm>
             <a:off x="504000" y="301320"/>
-            <a:ext cx="9071640" cy="1262160"/>
+            <a:ext cx="9071280" cy="1261800"/>
           </a:xfrm>
           <a:prstGeom prst="rect">
             <a:avLst/>
@@ -2723,10 +4356,20 @@
             <a:noFill/>
           </a:ln>
         </p:spPr>
+        <p:style>
+          <a:lnRef idx="0"/>
+          <a:fillRef idx="0"/>
+          <a:effectRef idx="0"/>
+          <a:fontRef idx="minor"/>
+        </p:style>
         <p:txBody>
           <a:bodyPr lIns="0" rIns="0" tIns="0" bIns="0" anchor="ctr"/>
           <a:p>
-            <a:pPr algn="ctr"/>
+            <a:pPr algn="ctr">
+              <a:lnSpc>
+                <a:spcPct val="100000"/>
+              </a:lnSpc>
+            </a:pPr>
             <a:r>
               <a:rPr b="0" lang="en-US" sz="4400" spc="-1" strike="noStrike">
                 <a:solidFill>
@@ -2741,30 +4384,30 @@
               </a:rPr>
               <a:t>Introduction</a:t>
             </a:r>
-            <a:endParaRPr b="0" lang="en-US" sz="4400" spc="-1" strike="noStrike">
-              <a:solidFill>
-                <a:srgbClr val="000000"/>
-              </a:solidFill>
-              <a:uFill>
-                <a:solidFill>
-                  <a:srgbClr val="ffffff"/>
-                </a:solidFill>
-              </a:uFill>
-              <a:latin typeface="Arial"/>
-            </a:endParaRPr>
-          </a:p>
-        </p:txBody>
-      </p:sp>
-      <p:sp>
-        <p:nvSpPr>
-          <p:cNvPr id="47" name="TextShape 2"/>
-          <p:cNvSpPr txBox="1"/>
+            <a:endParaRPr b="0" lang="en-US" sz="1800" spc="-1" strike="noStrike">
+              <a:solidFill>
+                <a:srgbClr val="000000"/>
+              </a:solidFill>
+              <a:uFill>
+                <a:solidFill>
+                  <a:srgbClr val="ffffff"/>
+                </a:solidFill>
+              </a:uFill>
+              <a:latin typeface="Arial"/>
+            </a:endParaRPr>
+          </a:p>
+        </p:txBody>
+      </p:sp>
+      <p:sp>
+        <p:nvSpPr>
+          <p:cNvPr id="80" name="CustomShape 2"/>
+          <p:cNvSpPr/>
           <p:nvPr/>
         </p:nvSpPr>
         <p:spPr>
           <a:xfrm>
             <a:off x="504000" y="1769040"/>
-            <a:ext cx="9071640" cy="4384440"/>
+            <a:ext cx="9071280" cy="4384080"/>
           </a:xfrm>
           <a:prstGeom prst="rect">
             <a:avLst/>
@@ -2774,10 +4417,19 @@
             <a:noFill/>
           </a:ln>
         </p:spPr>
+        <p:style>
+          <a:lnRef idx="0"/>
+          <a:fillRef idx="0"/>
+          <a:effectRef idx="0"/>
+          <a:fontRef idx="minor"/>
+        </p:style>
         <p:txBody>
           <a:bodyPr lIns="0" rIns="0" tIns="0" bIns="0"/>
           <a:p>
-            <a:pPr marL="432000" indent="-324000">
+            <a:pPr marL="432000" indent="-323640">
+              <a:lnSpc>
+                <a:spcPct val="100000"/>
+              </a:lnSpc>
               <a:buClr>
                 <a:srgbClr val="000000"/>
               </a:buClr>
@@ -2799,20 +4451,23 @@
               </a:rPr>
               <a:t>Recent events remind people that their data is not safe with third-parties.</a:t>
             </a:r>
-            <a:endParaRPr b="0" lang="en-US" sz="3200" spc="-1" strike="noStrike">
-              <a:solidFill>
-                <a:srgbClr val="000000"/>
-              </a:solidFill>
-              <a:uFill>
-                <a:solidFill>
-                  <a:srgbClr val="ffffff"/>
-                </a:solidFill>
-              </a:uFill>
-              <a:latin typeface="Arial"/>
-            </a:endParaRPr>
-          </a:p>
-          <a:p>
-            <a:pPr marL="432000" indent="-324000">
+            <a:endParaRPr b="0" lang="en-US" sz="1800" spc="-1" strike="noStrike">
+              <a:solidFill>
+                <a:srgbClr val="000000"/>
+              </a:solidFill>
+              <a:uFill>
+                <a:solidFill>
+                  <a:srgbClr val="ffffff"/>
+                </a:solidFill>
+              </a:uFill>
+              <a:latin typeface="Arial"/>
+            </a:endParaRPr>
+          </a:p>
+          <a:p>
+            <a:pPr marL="432000" indent="-323640">
+              <a:lnSpc>
+                <a:spcPct val="100000"/>
+              </a:lnSpc>
               <a:buClr>
                 <a:srgbClr val="000000"/>
               </a:buClr>
@@ -2834,20 +4489,23 @@
               </a:rPr>
               <a:t>Researchers develop tools for clients to interact  privately</a:t>
             </a:r>
-            <a:endParaRPr b="0" lang="en-US" sz="3200" spc="-1" strike="noStrike">
-              <a:solidFill>
-                <a:srgbClr val="000000"/>
-              </a:solidFill>
-              <a:uFill>
-                <a:solidFill>
-                  <a:srgbClr val="ffffff"/>
-                </a:solidFill>
-              </a:uFill>
-              <a:latin typeface="Arial"/>
-            </a:endParaRPr>
-          </a:p>
-          <a:p>
-            <a:pPr marL="432000" indent="-324000">
+            <a:endParaRPr b="0" lang="en-US" sz="1800" spc="-1" strike="noStrike">
+              <a:solidFill>
+                <a:srgbClr val="000000"/>
+              </a:solidFill>
+              <a:uFill>
+                <a:solidFill>
+                  <a:srgbClr val="ffffff"/>
+                </a:solidFill>
+              </a:uFill>
+              <a:latin typeface="Arial"/>
+            </a:endParaRPr>
+          </a:p>
+          <a:p>
+            <a:pPr marL="432000" indent="-323640">
+              <a:lnSpc>
+                <a:spcPct val="100000"/>
+              </a:lnSpc>
               <a:buClr>
                 <a:srgbClr val="000000"/>
               </a:buClr>
@@ -2869,7 +4527,7 @@
               </a:rPr>
               <a:t>There is a gap between current research and usability</a:t>
             </a:r>
-            <a:endParaRPr b="0" lang="en-US" sz="3200" spc="-1" strike="noStrike">
+            <a:endParaRPr b="0" lang="en-US" sz="1800" spc="-1" strike="noStrike">
               <a:solidFill>
                 <a:srgbClr val="000000"/>
               </a:solidFill>
@@ -2885,7 +4543,7 @@
       </p:sp>
       <p:pic>
         <p:nvPicPr>
-          <p:cNvPr id="48" name="" descr=""/>
+          <p:cNvPr id="81" name="" descr=""/>
           <p:cNvPicPr/>
           <p:nvPr/>
         </p:nvPicPr>
@@ -2896,7 +4554,7 @@
         <p:spPr>
           <a:xfrm>
             <a:off x="799200" y="5109480"/>
-            <a:ext cx="2949840" cy="1657080"/>
+            <a:ext cx="2949480" cy="1656720"/>
           </a:xfrm>
           <a:prstGeom prst="rect">
             <a:avLst/>
@@ -2908,7 +4566,7 @@
       </p:pic>
       <p:pic>
         <p:nvPicPr>
-          <p:cNvPr id="49" name="" descr=""/>
+          <p:cNvPr id="82" name="" descr=""/>
           <p:cNvPicPr/>
           <p:nvPr/>
         </p:nvPicPr>
@@ -2919,7 +4577,7 @@
         <p:spPr>
           <a:xfrm>
             <a:off x="5887440" y="5111640"/>
-            <a:ext cx="2953440" cy="1654920"/>
+            <a:ext cx="2953080" cy="1654560"/>
           </a:xfrm>
           <a:prstGeom prst="rect">
             <a:avLst/>
@@ -2980,14 +4638,14 @@
       </p:grpSpPr>
       <p:sp>
         <p:nvSpPr>
-          <p:cNvPr id="50" name="TextShape 1"/>
+          <p:cNvPr id="83" name="TextShape 1"/>
           <p:cNvSpPr txBox="1"/>
           <p:nvPr/>
         </p:nvSpPr>
         <p:spPr>
           <a:xfrm>
             <a:off x="504000" y="301320"/>
-            <a:ext cx="9071640" cy="1262160"/>
+            <a:ext cx="9071280" cy="1261800"/>
           </a:xfrm>
           <a:prstGeom prst="rect">
             <a:avLst/>
@@ -3001,43 +4659,21 @@
           <a:bodyPr lIns="0" rIns="0" tIns="0" bIns="0" anchor="ctr"/>
           <a:p>
             <a:pPr algn="ctr"/>
+            <a:r>
+              <a:rPr b="0" lang="en-US" sz="4400" spc="-1" strike="noStrike">
+                <a:solidFill>
+                  <a:srgbClr val="000000"/>
+                </a:solidFill>
+                <a:uFill>
+                  <a:solidFill>
+                    <a:srgbClr val="ffffff"/>
+                  </a:solidFill>
+                </a:uFill>
+                <a:latin typeface="Arial"/>
+              </a:rPr>
+              <a:t>Privacy</a:t>
+            </a:r>
             <a:endParaRPr b="0" lang="en-US" sz="4400" spc="-1" strike="noStrike">
-              <a:solidFill>
-                <a:srgbClr val="000000"/>
-              </a:solidFill>
-              <a:uFill>
-                <a:solidFill>
-                  <a:srgbClr val="ffffff"/>
-                </a:solidFill>
-              </a:uFill>
-              <a:latin typeface="Arial"/>
-            </a:endParaRPr>
-          </a:p>
-        </p:txBody>
-      </p:sp>
-      <p:sp>
-        <p:nvSpPr>
-          <p:cNvPr id="51" name="TextShape 2"/>
-          <p:cNvSpPr txBox="1"/>
-          <p:nvPr/>
-        </p:nvSpPr>
-        <p:spPr>
-          <a:xfrm>
-            <a:off x="504000" y="1769040"/>
-            <a:ext cx="9071640" cy="4384440"/>
-          </a:xfrm>
-          <a:prstGeom prst="rect">
-            <a:avLst/>
-          </a:prstGeom>
-          <a:noFill/>
-          <a:ln>
-            <a:noFill/>
-          </a:ln>
-        </p:spPr>
-        <p:txBody>
-          <a:bodyPr lIns="0" rIns="0" tIns="0" bIns="0"/>
-          <a:p>
-            <a:endParaRPr b="0" lang="en-US" sz="3200" spc="-1" strike="noStrike">
               <a:solidFill>
                 <a:srgbClr val="000000"/>
               </a:solidFill>
@@ -3053,33 +4689,6 @@
       </p:sp>
     </p:spTree>
   </p:cSld>
-  <p:timing>
-    <p:tnLst>
-      <p:par>
-        <p:cTn id="5" dur="indefinite" restart="never" nodeType="tmRoot">
-          <p:childTnLst>
-            <p:seq>
-              <p:cTn id="6" nodeType="mainSeq"/>
-              <p:prevCondLst>
-                <p:cond delay="0" evt="onPrev">
-                  <p:tgtEl>
-                    <p:sldTgt/>
-                  </p:tgtEl>
-                </p:cond>
-              </p:prevCondLst>
-              <p:nextCondLst>
-                <p:cond delay="0" evt="onNext">
-                  <p:tgtEl>
-                    <p:sldTgt/>
-                  </p:tgtEl>
-                </p:cond>
-              </p:nextCondLst>
-            </p:seq>
-          </p:childTnLst>
-        </p:cTn>
-      </p:par>
-    </p:tnLst>
-  </p:timing>
 </p:sld>
 </file>
 
@@ -3527,4 +5136,227 @@
     </a:fmtScheme>
   </a:themeElements>
 </a:theme>
+</file>
+
+<file path=ppt/theme/theme3.xml><?xml version="1.0" encoding="utf-8"?>
+<a:theme xmlns:a="http://schemas.openxmlformats.org/drawingml/2006/main" name="Office Theme">
+  <a:themeElements>
+    <a:clrScheme name="Office">
+      <a:dk1>
+        <a:sysClr val="windowText" lastClr="000000"/>
+      </a:dk1>
+      <a:lt1>
+        <a:sysClr val="window" lastClr="FFFFFF"/>
+      </a:lt1>
+      <a:dk2>
+        <a:srgbClr val="1F497D"/>
+      </a:dk2>
+      <a:lt2>
+        <a:srgbClr val="EEECE1"/>
+      </a:lt2>
+      <a:accent1>
+        <a:srgbClr val="4F81BD"/>
+      </a:accent1>
+      <a:accent2>
+        <a:srgbClr val="C0504D"/>
+      </a:accent2>
+      <a:accent3>
+        <a:srgbClr val="9BBB59"/>
+      </a:accent3>
+      <a:accent4>
+        <a:srgbClr val="8064A2"/>
+      </a:accent4>
+      <a:accent5>
+        <a:srgbClr val="4BACC6"/>
+      </a:accent5>
+      <a:accent6>
+        <a:srgbClr val="F79646"/>
+      </a:accent6>
+      <a:hlink>
+        <a:srgbClr val="0000FF"/>
+      </a:hlink>
+      <a:folHlink>
+        <a:srgbClr val="800080"/>
+      </a:folHlink>
+    </a:clrScheme>
+    <a:fontScheme name="Office">
+      <a:majorFont>
+        <a:latin typeface="Arial"/>
+        <a:ea typeface="DejaVu Sans"/>
+        <a:cs typeface="DejaVu Sans"/>
+      </a:majorFont>
+      <a:minorFont>
+        <a:latin typeface="Arial"/>
+        <a:ea typeface="DejaVu Sans"/>
+        <a:cs typeface="DejaVu Sans"/>
+      </a:minorFont>
+    </a:fontScheme>
+    <a:fmtScheme name="Office">
+      <a:fillStyleLst>
+        <a:solidFill>
+          <a:schemeClr val="phClr"/>
+        </a:solidFill>
+        <a:gradFill rotWithShape="1">
+          <a:gsLst>
+            <a:gs pos="0">
+              <a:schemeClr val="phClr">
+                <a:tint val="50000"/>
+                <a:satMod val="300000"/>
+              </a:schemeClr>
+            </a:gs>
+            <a:gs pos="35000">
+              <a:schemeClr val="phClr">
+                <a:tint val="37000"/>
+                <a:satMod val="300000"/>
+              </a:schemeClr>
+            </a:gs>
+            <a:gs pos="100000">
+              <a:schemeClr val="phClr">
+                <a:tint val="15000"/>
+                <a:satMod val="350000"/>
+              </a:schemeClr>
+            </a:gs>
+          </a:gsLst>
+          <a:lin ang="16200000" scaled="1"/>
+        </a:gradFill>
+        <a:gradFill rotWithShape="1">
+          <a:gsLst>
+            <a:gs pos="0">
+              <a:schemeClr val="phClr">
+                <a:shade val="51000"/>
+                <a:satMod val="130000"/>
+              </a:schemeClr>
+            </a:gs>
+            <a:gs pos="80000">
+              <a:schemeClr val="phClr">
+                <a:shade val="93000"/>
+                <a:satMod val="130000"/>
+              </a:schemeClr>
+            </a:gs>
+            <a:gs pos="100000">
+              <a:schemeClr val="phClr">
+                <a:shade val="94000"/>
+                <a:satMod val="135000"/>
+              </a:schemeClr>
+            </a:gs>
+          </a:gsLst>
+          <a:lin ang="16200000" scaled="0"/>
+        </a:gradFill>
+      </a:fillStyleLst>
+      <a:lnStyleLst>
+        <a:ln w="9525" cap="flat" cmpd="sng" algn="ctr">
+          <a:solidFill>
+            <a:schemeClr val="phClr">
+              <a:shade val="95000"/>
+              <a:satMod val="105000"/>
+            </a:schemeClr>
+          </a:solidFill>
+          <a:prstDash val="solid"/>
+        </a:ln>
+        <a:ln w="25400" cap="flat" cmpd="sng" algn="ctr">
+          <a:solidFill>
+            <a:schemeClr val="phClr"/>
+          </a:solidFill>
+          <a:prstDash val="solid"/>
+        </a:ln>
+        <a:ln w="38100" cap="flat" cmpd="sng" algn="ctr">
+          <a:solidFill>
+            <a:schemeClr val="phClr"/>
+          </a:solidFill>
+          <a:prstDash val="solid"/>
+        </a:ln>
+      </a:lnStyleLst>
+      <a:effectStyleLst>
+        <a:effectStyle>
+          <a:effectLst>
+            <a:outerShdw blurRad="40000" dist="20000" dir="5400000" rotWithShape="0">
+              <a:srgbClr val="000000">
+                <a:alpha val="38000"/>
+              </a:srgbClr>
+            </a:outerShdw>
+          </a:effectLst>
+        </a:effectStyle>
+        <a:effectStyle>
+          <a:effectLst>
+            <a:outerShdw blurRad="40000" dist="23000" dir="5400000" rotWithShape="0">
+              <a:srgbClr val="000000">
+                <a:alpha val="35000"/>
+              </a:srgbClr>
+            </a:outerShdw>
+          </a:effectLst>
+        </a:effectStyle>
+        <a:effectStyle>
+          <a:effectLst>
+            <a:outerShdw blurRad="40000" dist="23000" dir="5400000" rotWithShape="0">
+              <a:srgbClr val="000000">
+                <a:alpha val="35000"/>
+              </a:srgbClr>
+            </a:outerShdw>
+          </a:effectLst>
+          <a:scene3d>
+            <a:camera prst="orthographicFront">
+              <a:rot lat="0" lon="0" rev="0"/>
+            </a:camera>
+            <a:lightRig rig="threePt" dir="t">
+              <a:rot lat="0" lon="0" rev="1200000"/>
+            </a:lightRig>
+          </a:scene3d>
+          <a:sp3d>
+            <a:bevelT w="63500" h="25400"/>
+          </a:sp3d>
+        </a:effectStyle>
+      </a:effectStyleLst>
+      <a:bgFillStyleLst>
+        <a:solidFill>
+          <a:schemeClr val="phClr"/>
+        </a:solidFill>
+        <a:gradFill rotWithShape="1">
+          <a:gsLst>
+            <a:gs pos="0">
+              <a:schemeClr val="phClr">
+                <a:tint val="40000"/>
+                <a:satMod val="350000"/>
+              </a:schemeClr>
+            </a:gs>
+            <a:gs pos="40000">
+              <a:schemeClr val="phClr">
+                <a:tint val="45000"/>
+                <a:shade val="99000"/>
+                <a:satMod val="350000"/>
+              </a:schemeClr>
+            </a:gs>
+            <a:gs pos="100000">
+              <a:schemeClr val="phClr">
+                <a:shade val="20000"/>
+                <a:satMod val="255000"/>
+              </a:schemeClr>
+            </a:gs>
+          </a:gsLst>
+          <a:path path="circle">
+            <a:fillToRect l="50000" t="-80000" r="50000" b="180000"/>
+          </a:path>
+        </a:gradFill>
+        <a:gradFill rotWithShape="1">
+          <a:gsLst>
+            <a:gs pos="0">
+              <a:schemeClr val="phClr">
+                <a:tint val="80000"/>
+                <a:satMod val="300000"/>
+              </a:schemeClr>
+            </a:gs>
+            <a:gs pos="100000">
+              <a:schemeClr val="phClr">
+                <a:shade val="30000"/>
+                <a:satMod val="200000"/>
+              </a:schemeClr>
+            </a:gs>
+          </a:gsLst>
+          <a:path path="circle">
+            <a:fillToRect l="50000" t="50000" r="50000" b="50000"/>
+          </a:path>
+        </a:gradFill>
+      </a:bgFillStyleLst>
+    </a:fmtScheme>
+  </a:themeElements>
+</a:theme>
 </file>
</xml_diff>